<commit_message>
source.pdf javítások 🛠, Perezntációk/Kecskemet-net ✔
</commit_message>
<xml_diff>
--- a/Prezentációk/School_projects_ppt.pptx
+++ b/Prezentációk/School_projects_ppt.pptx
@@ -5,7 +5,7 @@
     <p:sldMasterId id="2147483648" r:id="rId1"/>
   </p:sldMasterIdLst>
   <p:notesMasterIdLst>
-    <p:notesMasterId r:id="rId28"/>
+    <p:notesMasterId r:id="rId32"/>
   </p:notesMasterIdLst>
   <p:sldIdLst>
     <p:sldId id="256" r:id="rId2"/>
@@ -33,7 +33,11 @@
     <p:sldId id="278" r:id="rId24"/>
     <p:sldId id="279" r:id="rId25"/>
     <p:sldId id="281" r:id="rId26"/>
-    <p:sldId id="280" r:id="rId27"/>
+    <p:sldId id="282" r:id="rId27"/>
+    <p:sldId id="283" r:id="rId28"/>
+    <p:sldId id="284" r:id="rId29"/>
+    <p:sldId id="285" r:id="rId30"/>
+    <p:sldId id="280" r:id="rId31"/>
   </p:sldIdLst>
   <p:sldSz cx="12192000" cy="6858000"/>
   <p:notesSz cx="6858000" cy="9144000"/>
@@ -271,7 +275,7 @@
       <p15:sldGuideLst xmlns:p15="http://schemas.microsoft.com/office/powerpoint/2012/main"/>
     </p:ext>
     <p:ext uri="http://customooxmlschemas.google.com/">
-      <go:slidesCustomData xmlns:go="http://customooxmlschemas.google.com/" xmlns:ahyp="http://schemas.microsoft.com/office/drawing/2018/hyperlinkcolor" xmlns:p15="http://schemas.microsoft.com/office/powerpoint/2012/main" xmlns:p14="http://schemas.microsoft.com/office/powerpoint/2010/main" xmlns:com="http://schemas.openxmlformats.org/drawingml/2006/compatibility" xmlns:pvml="urn:schemas-microsoft-com:office:powerpoint" xmlns:v="urn:schemas-microsoft-com:vml" xmlns:o="urn:schemas-microsoft-com:office:office" xmlns:dgm="http://schemas.openxmlformats.org/drawingml/2006/diagram" xmlns:c="http://schemas.openxmlformats.org/drawingml/2006/chart" xmlns:mv="urn:schemas-microsoft-com:mac:vml" xmlns:mc="http://schemas.openxmlformats.org/markup-compatibility/2006" xmlns="" r:id="rId30" roundtripDataSignature="AMtx7mh4tgGCVRmDJL4jUWD9jkarnXnmPQ=="/>
+      <go:slidesCustomData xmlns="" xmlns:mc="http://schemas.openxmlformats.org/markup-compatibility/2006" xmlns:mv="urn:schemas-microsoft-com:mac:vml" xmlns:c="http://schemas.openxmlformats.org/drawingml/2006/chart" xmlns:dgm="http://schemas.openxmlformats.org/drawingml/2006/diagram" xmlns:o="urn:schemas-microsoft-com:office:office" xmlns:v="urn:schemas-microsoft-com:vml" xmlns:pvml="urn:schemas-microsoft-com:office:powerpoint" xmlns:com="http://schemas.openxmlformats.org/drawingml/2006/compatibility" xmlns:p14="http://schemas.microsoft.com/office/powerpoint/2010/main" xmlns:p15="http://schemas.microsoft.com/office/powerpoint/2012/main" xmlns:ahyp="http://schemas.microsoft.com/office/drawing/2018/hyperlinkcolor" xmlns:go="http://customooxmlschemas.google.com/" r:id="rId33" roundtripDataSignature="AMtx7mh4tgGCVRmDJL4jUWD9jkarnXnmPQ=="/>
     </p:ext>
   </p:extLst>
 </p:presentation>
@@ -18047,7 +18051,7 @@
   <p:cSld>
     <p:spTree>
       <p:nvGrpSpPr>
-        <p:cNvPr id="1" name="Shape 258"/>
+        <p:cNvPr id="1" name=""/>
         <p:cNvGrpSpPr/>
         <p:nvPr/>
       </p:nvGrpSpPr>
@@ -18061,85 +18065,381 @@
       </p:grpSpPr>
       <p:sp>
         <p:nvSpPr>
-          <p:cNvPr id="259" name="Google Shape;259;g18fd315c07e_0_483"/>
-          <p:cNvSpPr txBox="1">
+          <p:cNvPr id="2" name="Cím 1">
+            <a:extLst>
+              <a:ext uri="{FF2B5EF4-FFF2-40B4-BE49-F238E27FC236}">
+                <a16:creationId xmlns:a16="http://schemas.microsoft.com/office/drawing/2014/main" id="{971FBC59-FEA6-6792-CEAC-FC9D4F44A103}"/>
+              </a:ext>
+            </a:extLst>
+          </p:cNvPr>
+          <p:cNvSpPr>
             <a:spLocks noGrp="1"/>
           </p:cNvSpPr>
           <p:nvPr>
             <p:ph type="ctrTitle"/>
           </p:nvPr>
         </p:nvSpPr>
-        <p:spPr>
-          <a:xfrm>
-            <a:off x="1524000" y="1122363"/>
-            <a:ext cx="9144000" cy="2387700"/>
-          </a:xfrm>
-          <a:prstGeom prst="rect">
-            <a:avLst/>
-          </a:prstGeom>
-        </p:spPr>
+        <p:spPr/>
         <p:txBody>
-          <a:bodyPr spcFirstLastPara="1" wrap="square" lIns="91425" tIns="45700" rIns="91425" bIns="45700" anchor="b" anchorCtr="0">
-            <a:normAutofit/>
-          </a:bodyPr>
+          <a:bodyPr/>
           <a:lstStyle/>
           <a:p>
-            <a:pPr marL="0" lvl="0" indent="0" algn="ctr" rtl="0">
-              <a:spcBef>
-                <a:spcPts val="0"/>
-              </a:spcBef>
-              <a:spcAft>
-                <a:spcPts val="0"/>
-              </a:spcAft>
-              <a:buNone/>
-            </a:pPr>
             <a:r>
-              <a:rPr lang="hu-HU"/>
-              <a:t>Köszönjük a figyelmet!</a:t>
+              <a:rPr lang="hu-HU" dirty="0"/>
+              <a:t>Kecskemét-net hálózat konfigurálása</a:t>
             </a:r>
-            <a:endParaRPr/>
           </a:p>
         </p:txBody>
       </p:sp>
       <p:sp>
         <p:nvSpPr>
-          <p:cNvPr id="260" name="Google Shape;260;g18fd315c07e_0_483"/>
-          <p:cNvSpPr txBox="1">
+          <p:cNvPr id="3" name="Alcím 2">
+            <a:extLst>
+              <a:ext uri="{FF2B5EF4-FFF2-40B4-BE49-F238E27FC236}">
+                <a16:creationId xmlns:a16="http://schemas.microsoft.com/office/drawing/2014/main" id="{3B4EE50B-3929-4A19-4180-E4CB31782A9B}"/>
+              </a:ext>
+            </a:extLst>
+          </p:cNvPr>
+          <p:cNvSpPr>
             <a:spLocks noGrp="1"/>
           </p:cNvSpPr>
           <p:nvPr>
             <p:ph type="subTitle" idx="1"/>
           </p:nvPr>
         </p:nvSpPr>
+        <p:spPr/>
+        <p:txBody>
+          <a:bodyPr/>
+          <a:lstStyle/>
+          <a:p>
+            <a:r>
+              <a:rPr lang="hu-HU" dirty="0"/>
+              <a:t>Készítette: Jelenovits Milán</a:t>
+            </a:r>
+          </a:p>
+        </p:txBody>
+      </p:sp>
+    </p:spTree>
+    <p:extLst>
+      <p:ext uri="{BB962C8B-B14F-4D97-AF65-F5344CB8AC3E}">
+        <p14:creationId xmlns:p14="http://schemas.microsoft.com/office/powerpoint/2010/main" val="2815363080"/>
+      </p:ext>
+    </p:extLst>
+  </p:cSld>
+  <p:clrMapOvr>
+    <a:masterClrMapping/>
+  </p:clrMapOvr>
+</p:sld>
+</file>
+
+<file path=ppt/slides/slide27.xml><?xml version="1.0" encoding="utf-8"?>
+<p:sld xmlns:a="http://schemas.openxmlformats.org/drawingml/2006/main" xmlns:r="http://schemas.openxmlformats.org/officeDocument/2006/relationships" xmlns:p="http://schemas.openxmlformats.org/presentationml/2006/main">
+  <p:cSld>
+    <p:spTree>
+      <p:nvGrpSpPr>
+        <p:cNvPr id="1" name=""/>
+        <p:cNvGrpSpPr/>
+        <p:nvPr/>
+      </p:nvGrpSpPr>
+      <p:grpSpPr>
+        <a:xfrm>
+          <a:off x="0" y="0"/>
+          <a:ext cx="0" cy="0"/>
+          <a:chOff x="0" y="0"/>
+          <a:chExt cx="0" cy="0"/>
+        </a:xfrm>
+      </p:grpSpPr>
+      <p:sp>
+        <p:nvSpPr>
+          <p:cNvPr id="2" name="Cím 1">
+            <a:extLst>
+              <a:ext uri="{FF2B5EF4-FFF2-40B4-BE49-F238E27FC236}">
+                <a16:creationId xmlns:a16="http://schemas.microsoft.com/office/drawing/2014/main" id="{A7AD66F6-221F-6517-B75B-6DE430632417}"/>
+              </a:ext>
+            </a:extLst>
+          </p:cNvPr>
+          <p:cNvSpPr>
+            <a:spLocks noGrp="1"/>
+          </p:cNvSpPr>
+          <p:nvPr>
+            <p:ph type="title"/>
+          </p:nvPr>
+        </p:nvSpPr>
+        <p:spPr/>
+        <p:txBody>
+          <a:bodyPr/>
+          <a:lstStyle/>
+          <a:p>
+            <a:pPr algn="ctr"/>
+            <a:r>
+              <a:rPr lang="hu-HU" dirty="0"/>
+              <a:t>Topológia</a:t>
+            </a:r>
+          </a:p>
+        </p:txBody>
+      </p:sp>
+      <p:pic>
+        <p:nvPicPr>
+          <p:cNvPr id="5" name="Kép 4">
+            <a:extLst>
+              <a:ext uri="{FF2B5EF4-FFF2-40B4-BE49-F238E27FC236}">
+                <a16:creationId xmlns:a16="http://schemas.microsoft.com/office/drawing/2014/main" id="{DEBDCE1C-DEDE-227B-13F2-2CF573770675}"/>
+              </a:ext>
+            </a:extLst>
+          </p:cNvPr>
+          <p:cNvPicPr>
+            <a:picLocks noChangeAspect="1"/>
+          </p:cNvPicPr>
+          <p:nvPr/>
+        </p:nvPicPr>
+        <p:blipFill>
+          <a:blip r:embed="rId2"/>
+          <a:stretch>
+            <a:fillRect/>
+          </a:stretch>
+        </p:blipFill>
         <p:spPr>
           <a:xfrm>
-            <a:off x="1524000" y="3602038"/>
-            <a:ext cx="9144000" cy="1655700"/>
+            <a:off x="3966978" y="1690688"/>
+            <a:ext cx="4258044" cy="4298597"/>
           </a:xfrm>
           <a:prstGeom prst="rect">
             <a:avLst/>
           </a:prstGeom>
         </p:spPr>
+      </p:pic>
+    </p:spTree>
+    <p:extLst>
+      <p:ext uri="{BB962C8B-B14F-4D97-AF65-F5344CB8AC3E}">
+        <p14:creationId xmlns:p14="http://schemas.microsoft.com/office/powerpoint/2010/main" val="643235215"/>
+      </p:ext>
+    </p:extLst>
+  </p:cSld>
+  <p:clrMapOvr>
+    <a:masterClrMapping/>
+  </p:clrMapOvr>
+</p:sld>
+</file>
+
+<file path=ppt/slides/slide28.xml><?xml version="1.0" encoding="utf-8"?>
+<p:sld xmlns:a="http://schemas.openxmlformats.org/drawingml/2006/main" xmlns:r="http://schemas.openxmlformats.org/officeDocument/2006/relationships" xmlns:p="http://schemas.openxmlformats.org/presentationml/2006/main">
+  <p:cSld>
+    <p:spTree>
+      <p:nvGrpSpPr>
+        <p:cNvPr id="1" name=""/>
+        <p:cNvGrpSpPr/>
+        <p:nvPr/>
+      </p:nvGrpSpPr>
+      <p:grpSpPr>
+        <a:xfrm>
+          <a:off x="0" y="0"/>
+          <a:ext cx="0" cy="0"/>
+          <a:chOff x="0" y="0"/>
+          <a:chExt cx="0" cy="0"/>
+        </a:xfrm>
+      </p:grpSpPr>
+      <p:sp>
+        <p:nvSpPr>
+          <p:cNvPr id="2" name="Cím 1">
+            <a:extLst>
+              <a:ext uri="{FF2B5EF4-FFF2-40B4-BE49-F238E27FC236}">
+                <a16:creationId xmlns:a16="http://schemas.microsoft.com/office/drawing/2014/main" id="{B062E9B0-1B88-88A4-933D-6D7A827497F5}"/>
+              </a:ext>
+            </a:extLst>
+          </p:cNvPr>
+          <p:cNvSpPr>
+            <a:spLocks noGrp="1"/>
+          </p:cNvSpPr>
+          <p:nvPr>
+            <p:ph type="title"/>
+          </p:nvPr>
+        </p:nvSpPr>
+        <p:spPr/>
         <p:txBody>
-          <a:bodyPr spcFirstLastPara="1" wrap="square" lIns="91425" tIns="45700" rIns="91425" bIns="45700" anchor="t" anchorCtr="0">
-            <a:normAutofit/>
-          </a:bodyPr>
+          <a:bodyPr/>
           <a:lstStyle/>
           <a:p>
-            <a:pPr marL="0" lvl="0" indent="0" algn="ctr" rtl="0">
-              <a:spcBef>
-                <a:spcPts val="1000"/>
-              </a:spcBef>
-              <a:spcAft>
-                <a:spcPts val="0"/>
-              </a:spcAft>
-              <a:buNone/>
-            </a:pPr>
-            <a:endParaRPr/>
+            <a:pPr algn="ctr"/>
+            <a:r>
+              <a:rPr lang="hu-HU" dirty="0"/>
+              <a:t>Számítógépeken IP címek</a:t>
+            </a:r>
           </a:p>
         </p:txBody>
       </p:sp>
+      <p:sp>
+        <p:nvSpPr>
+          <p:cNvPr id="3" name="Szöveg helye 2">
+            <a:extLst>
+              <a:ext uri="{FF2B5EF4-FFF2-40B4-BE49-F238E27FC236}">
+                <a16:creationId xmlns:a16="http://schemas.microsoft.com/office/drawing/2014/main" id="{1A93980F-EA8C-2B1E-42C8-F1DC69ED03C9}"/>
+              </a:ext>
+            </a:extLst>
+          </p:cNvPr>
+          <p:cNvSpPr>
+            <a:spLocks noGrp="1"/>
+          </p:cNvSpPr>
+          <p:nvPr>
+            <p:ph type="body" idx="1"/>
+          </p:nvPr>
+        </p:nvSpPr>
+        <p:spPr/>
+        <p:txBody>
+          <a:bodyPr/>
+          <a:lstStyle/>
+          <a:p>
+            <a:pPr algn="ctr"/>
+            <a:r>
+              <a:rPr lang="hu-HU" dirty="0"/>
+              <a:t>PC-K1: 185.62.128.132</a:t>
+            </a:r>
+          </a:p>
+          <a:p>
+            <a:pPr algn="ctr"/>
+            <a:r>
+              <a:rPr lang="hu-HU" dirty="0"/>
+              <a:t>PC-K2: 185.62.128.133</a:t>
+            </a:r>
+          </a:p>
+          <a:p>
+            <a:pPr algn="ctr"/>
+            <a:r>
+              <a:rPr lang="hu-HU" dirty="0"/>
+              <a:t>PC-K3: 185.62.128.134</a:t>
+            </a:r>
+          </a:p>
+          <a:p>
+            <a:endParaRPr lang="hu-HU" dirty="0"/>
+          </a:p>
+        </p:txBody>
+      </p:sp>
+      <p:pic>
+        <p:nvPicPr>
+          <p:cNvPr id="5" name="Kép 4">
+            <a:extLst>
+              <a:ext uri="{FF2B5EF4-FFF2-40B4-BE49-F238E27FC236}">
+                <a16:creationId xmlns:a16="http://schemas.microsoft.com/office/drawing/2014/main" id="{E89CEFCD-E2F1-9190-6411-C1D920B8C8C4}"/>
+              </a:ext>
+            </a:extLst>
+          </p:cNvPr>
+          <p:cNvPicPr>
+            <a:picLocks noChangeAspect="1"/>
+          </p:cNvPicPr>
+          <p:nvPr/>
+        </p:nvPicPr>
+        <p:blipFill>
+          <a:blip r:embed="rId2"/>
+          <a:stretch>
+            <a:fillRect/>
+          </a:stretch>
+        </p:blipFill>
+        <p:spPr>
+          <a:xfrm>
+            <a:off x="1711368" y="3685013"/>
+            <a:ext cx="8769263" cy="2271082"/>
+          </a:xfrm>
+          <a:prstGeom prst="rect">
+            <a:avLst/>
+          </a:prstGeom>
+        </p:spPr>
+      </p:pic>
     </p:spTree>
+    <p:extLst>
+      <p:ext uri="{BB962C8B-B14F-4D97-AF65-F5344CB8AC3E}">
+        <p14:creationId xmlns:p14="http://schemas.microsoft.com/office/powerpoint/2010/main" val="2281940919"/>
+      </p:ext>
+    </p:extLst>
+  </p:cSld>
+  <p:clrMapOvr>
+    <a:masterClrMapping/>
+  </p:clrMapOvr>
+</p:sld>
+</file>
+
+<file path=ppt/slides/slide29.xml><?xml version="1.0" encoding="utf-8"?>
+<p:sld xmlns:a="http://schemas.openxmlformats.org/drawingml/2006/main" xmlns:r="http://schemas.openxmlformats.org/officeDocument/2006/relationships" xmlns:p="http://schemas.openxmlformats.org/presentationml/2006/main">
+  <p:cSld>
+    <p:spTree>
+      <p:nvGrpSpPr>
+        <p:cNvPr id="1" name=""/>
+        <p:cNvGrpSpPr/>
+        <p:nvPr/>
+      </p:nvGrpSpPr>
+      <p:grpSpPr>
+        <a:xfrm>
+          <a:off x="0" y="0"/>
+          <a:ext cx="0" cy="0"/>
+          <a:chOff x="0" y="0"/>
+          <a:chExt cx="0" cy="0"/>
+        </a:xfrm>
+      </p:grpSpPr>
+      <p:sp>
+        <p:nvSpPr>
+          <p:cNvPr id="2" name="Cím 1">
+            <a:extLst>
+              <a:ext uri="{FF2B5EF4-FFF2-40B4-BE49-F238E27FC236}">
+                <a16:creationId xmlns:a16="http://schemas.microsoft.com/office/drawing/2014/main" id="{B155B8BD-2A15-0A53-F377-DDC050FE8929}"/>
+              </a:ext>
+            </a:extLst>
+          </p:cNvPr>
+          <p:cNvSpPr>
+            <a:spLocks noGrp="1"/>
+          </p:cNvSpPr>
+          <p:nvPr>
+            <p:ph type="title"/>
+          </p:nvPr>
+        </p:nvSpPr>
+        <p:spPr/>
+        <p:txBody>
+          <a:bodyPr/>
+          <a:lstStyle/>
+          <a:p>
+            <a:r>
+              <a:rPr lang="hu-HU" dirty="0">
+                <a:effectLst/>
+              </a:rPr>
+              <a:t>SW Kecskemét konfigurációja</a:t>
+            </a:r>
+            <a:endParaRPr lang="hu-HU" dirty="0"/>
+          </a:p>
+        </p:txBody>
+      </p:sp>
+      <p:pic>
+        <p:nvPicPr>
+          <p:cNvPr id="5" name="Kép 4">
+            <a:extLst>
+              <a:ext uri="{FF2B5EF4-FFF2-40B4-BE49-F238E27FC236}">
+                <a16:creationId xmlns:a16="http://schemas.microsoft.com/office/drawing/2014/main" id="{01588077-A0E1-90BF-B193-4980082D2F76}"/>
+              </a:ext>
+            </a:extLst>
+          </p:cNvPr>
+          <p:cNvPicPr>
+            <a:picLocks noChangeAspect="1"/>
+          </p:cNvPicPr>
+          <p:nvPr/>
+        </p:nvPicPr>
+        <p:blipFill>
+          <a:blip r:embed="rId2"/>
+          <a:stretch>
+            <a:fillRect/>
+          </a:stretch>
+        </p:blipFill>
+        <p:spPr>
+          <a:xfrm>
+            <a:off x="944184" y="1542605"/>
+            <a:ext cx="4397389" cy="4850062"/>
+          </a:xfrm>
+          <a:prstGeom prst="rect">
+            <a:avLst/>
+          </a:prstGeom>
+        </p:spPr>
+      </p:pic>
+    </p:spTree>
+    <p:extLst>
+      <p:ext uri="{BB962C8B-B14F-4D97-AF65-F5344CB8AC3E}">
+        <p14:creationId xmlns:p14="http://schemas.microsoft.com/office/powerpoint/2010/main" val="1171055110"/>
+      </p:ext>
+    </p:extLst>
   </p:cSld>
   <p:clrMapOvr>
     <a:masterClrMapping/>
@@ -18482,6 +18782,111 @@
           </a:ln>
         </p:spPr>
       </p:pic>
+    </p:spTree>
+  </p:cSld>
+  <p:clrMapOvr>
+    <a:masterClrMapping/>
+  </p:clrMapOvr>
+</p:sld>
+</file>
+
+<file path=ppt/slides/slide30.xml><?xml version="1.0" encoding="utf-8"?>
+<p:sld xmlns:a="http://schemas.openxmlformats.org/drawingml/2006/main" xmlns:r="http://schemas.openxmlformats.org/officeDocument/2006/relationships" xmlns:p="http://schemas.openxmlformats.org/presentationml/2006/main">
+  <p:cSld>
+    <p:spTree>
+      <p:nvGrpSpPr>
+        <p:cNvPr id="1" name="Shape 258"/>
+        <p:cNvGrpSpPr/>
+        <p:nvPr/>
+      </p:nvGrpSpPr>
+      <p:grpSpPr>
+        <a:xfrm>
+          <a:off x="0" y="0"/>
+          <a:ext cx="0" cy="0"/>
+          <a:chOff x="0" y="0"/>
+          <a:chExt cx="0" cy="0"/>
+        </a:xfrm>
+      </p:grpSpPr>
+      <p:sp>
+        <p:nvSpPr>
+          <p:cNvPr id="259" name="Google Shape;259;g18fd315c07e_0_483"/>
+          <p:cNvSpPr txBox="1">
+            <a:spLocks noGrp="1"/>
+          </p:cNvSpPr>
+          <p:nvPr>
+            <p:ph type="ctrTitle"/>
+          </p:nvPr>
+        </p:nvSpPr>
+        <p:spPr>
+          <a:xfrm>
+            <a:off x="1524000" y="1122363"/>
+            <a:ext cx="9144000" cy="2387700"/>
+          </a:xfrm>
+          <a:prstGeom prst="rect">
+            <a:avLst/>
+          </a:prstGeom>
+        </p:spPr>
+        <p:txBody>
+          <a:bodyPr spcFirstLastPara="1" wrap="square" lIns="91425" tIns="45700" rIns="91425" bIns="45700" anchor="b" anchorCtr="0">
+            <a:normAutofit/>
+          </a:bodyPr>
+          <a:lstStyle/>
+          <a:p>
+            <a:pPr marL="0" lvl="0" indent="0" algn="ctr" rtl="0">
+              <a:spcBef>
+                <a:spcPts val="0"/>
+              </a:spcBef>
+              <a:spcAft>
+                <a:spcPts val="0"/>
+              </a:spcAft>
+              <a:buNone/>
+            </a:pPr>
+            <a:r>
+              <a:rPr lang="hu-HU"/>
+              <a:t>Köszönjük a figyelmet!</a:t>
+            </a:r>
+            <a:endParaRPr/>
+          </a:p>
+        </p:txBody>
+      </p:sp>
+      <p:sp>
+        <p:nvSpPr>
+          <p:cNvPr id="260" name="Google Shape;260;g18fd315c07e_0_483"/>
+          <p:cNvSpPr txBox="1">
+            <a:spLocks noGrp="1"/>
+          </p:cNvSpPr>
+          <p:nvPr>
+            <p:ph type="subTitle" idx="1"/>
+          </p:nvPr>
+        </p:nvSpPr>
+        <p:spPr>
+          <a:xfrm>
+            <a:off x="1524000" y="3602038"/>
+            <a:ext cx="9144000" cy="1655700"/>
+          </a:xfrm>
+          <a:prstGeom prst="rect">
+            <a:avLst/>
+          </a:prstGeom>
+        </p:spPr>
+        <p:txBody>
+          <a:bodyPr spcFirstLastPara="1" wrap="square" lIns="91425" tIns="45700" rIns="91425" bIns="45700" anchor="t" anchorCtr="0">
+            <a:normAutofit/>
+          </a:bodyPr>
+          <a:lstStyle/>
+          <a:p>
+            <a:pPr marL="0" lvl="0" indent="0" algn="ctr" rtl="0">
+              <a:spcBef>
+                <a:spcPts val="1000"/>
+              </a:spcBef>
+              <a:spcAft>
+                <a:spcPts val="0"/>
+              </a:spcAft>
+              <a:buNone/>
+            </a:pPr>
+            <a:endParaRPr/>
+          </a:p>
+        </p:txBody>
+      </p:sp>
     </p:spTree>
   </p:cSld>
   <p:clrMapOvr>

</xml_diff>

<commit_message>
szolnok fix + prezentáció
</commit_message>
<xml_diff>
--- a/Prezentációk/School_projects_ppt.pptx
+++ b/Prezentációk/School_projects_ppt.pptx
@@ -5,7 +5,7 @@
     <p:sldMasterId id="2147483648" r:id="rId1"/>
   </p:sldMasterIdLst>
   <p:notesMasterIdLst>
-    <p:notesMasterId r:id="rId32"/>
+    <p:notesMasterId r:id="rId40"/>
   </p:notesMasterIdLst>
   <p:sldIdLst>
     <p:sldId id="256" r:id="rId2"/>
@@ -37,7 +37,15 @@
     <p:sldId id="283" r:id="rId28"/>
     <p:sldId id="284" r:id="rId29"/>
     <p:sldId id="285" r:id="rId30"/>
-    <p:sldId id="280" r:id="rId31"/>
+    <p:sldId id="286" r:id="rId31"/>
+    <p:sldId id="289" r:id="rId32"/>
+    <p:sldId id="287" r:id="rId33"/>
+    <p:sldId id="288" r:id="rId34"/>
+    <p:sldId id="290" r:id="rId35"/>
+    <p:sldId id="291" r:id="rId36"/>
+    <p:sldId id="292" r:id="rId37"/>
+    <p:sldId id="293" r:id="rId38"/>
+    <p:sldId id="280" r:id="rId39"/>
   </p:sldIdLst>
   <p:sldSz cx="12192000" cy="6858000"/>
   <p:notesSz cx="6858000" cy="9144000"/>
@@ -275,7 +283,7 @@
       <p15:sldGuideLst xmlns:p15="http://schemas.microsoft.com/office/powerpoint/2012/main"/>
     </p:ext>
     <p:ext uri="http://customooxmlschemas.google.com/">
-      <go:slidesCustomData xmlns:go="http://customooxmlschemas.google.com/" xmlns:ahyp="http://schemas.microsoft.com/office/drawing/2018/hyperlinkcolor" xmlns:p15="http://schemas.microsoft.com/office/powerpoint/2012/main" xmlns:p14="http://schemas.microsoft.com/office/powerpoint/2010/main" xmlns:com="http://schemas.openxmlformats.org/drawingml/2006/compatibility" xmlns:pvml="urn:schemas-microsoft-com:office:powerpoint" xmlns:v="urn:schemas-microsoft-com:vml" xmlns:o="urn:schemas-microsoft-com:office:office" xmlns:dgm="http://schemas.openxmlformats.org/drawingml/2006/diagram" xmlns:c="http://schemas.openxmlformats.org/drawingml/2006/chart" xmlns:mv="urn:schemas-microsoft-com:mac:vml" xmlns:mc="http://schemas.openxmlformats.org/markup-compatibility/2006" xmlns="" r:id="rId33" roundtripDataSignature="AMtx7mh4tgGCVRmDJL4jUWD9jkarnXnmPQ=="/>
+      <go:slidesCustomData xmlns="" xmlns:mc="http://schemas.openxmlformats.org/markup-compatibility/2006" xmlns:mv="urn:schemas-microsoft-com:mac:vml" xmlns:c="http://schemas.openxmlformats.org/drawingml/2006/chart" xmlns:dgm="http://schemas.openxmlformats.org/drawingml/2006/diagram" xmlns:o="urn:schemas-microsoft-com:office:office" xmlns:v="urn:schemas-microsoft-com:vml" xmlns:pvml="urn:schemas-microsoft-com:office:powerpoint" xmlns:com="http://schemas.openxmlformats.org/drawingml/2006/compatibility" xmlns:p14="http://schemas.microsoft.com/office/powerpoint/2010/main" xmlns:p15="http://schemas.microsoft.com/office/powerpoint/2012/main" xmlns:ahyp="http://schemas.microsoft.com/office/drawing/2018/hyperlinkcolor" xmlns:go="http://customooxmlschemas.google.com/" r:id="rId41" roundtripDataSignature="AMtx7mh4tgGCVRmDJL4jUWD9jkarnXnmPQ=="/>
     </p:ext>
   </p:extLst>
 </p:presentation>
@@ -18722,6 +18730,859 @@
   <p:cSld>
     <p:spTree>
       <p:nvGrpSpPr>
+        <p:cNvPr id="1" name=""/>
+        <p:cNvGrpSpPr/>
+        <p:nvPr/>
+      </p:nvGrpSpPr>
+      <p:grpSpPr>
+        <a:xfrm>
+          <a:off x="0" y="0"/>
+          <a:ext cx="0" cy="0"/>
+          <a:chOff x="0" y="0"/>
+          <a:chExt cx="0" cy="0"/>
+        </a:xfrm>
+      </p:grpSpPr>
+      <p:sp>
+        <p:nvSpPr>
+          <p:cNvPr id="2" name="Cím 1">
+            <a:extLst>
+              <a:ext uri="{FF2B5EF4-FFF2-40B4-BE49-F238E27FC236}">
+                <a16:creationId xmlns:a16="http://schemas.microsoft.com/office/drawing/2014/main" id="{82A2FC31-A4ED-457C-AC6C-25B5C5914332}"/>
+              </a:ext>
+            </a:extLst>
+          </p:cNvPr>
+          <p:cNvSpPr>
+            <a:spLocks noGrp="1"/>
+          </p:cNvSpPr>
+          <p:nvPr>
+            <p:ph type="ctrTitle"/>
+          </p:nvPr>
+        </p:nvSpPr>
+        <p:spPr/>
+        <p:txBody>
+          <a:bodyPr/>
+          <a:lstStyle/>
+          <a:p>
+            <a:r>
+              <a:rPr lang="hu-HU" dirty="0"/>
+              <a:t>Szeged-net hálózat konfigurálása</a:t>
+            </a:r>
+          </a:p>
+        </p:txBody>
+      </p:sp>
+      <p:sp>
+        <p:nvSpPr>
+          <p:cNvPr id="3" name="Alcím 2">
+            <a:extLst>
+              <a:ext uri="{FF2B5EF4-FFF2-40B4-BE49-F238E27FC236}">
+                <a16:creationId xmlns:a16="http://schemas.microsoft.com/office/drawing/2014/main" id="{2AE3C4AD-341B-40F8-86CB-0B0CDAEB2A21}"/>
+              </a:ext>
+            </a:extLst>
+          </p:cNvPr>
+          <p:cNvSpPr>
+            <a:spLocks noGrp="1"/>
+          </p:cNvSpPr>
+          <p:nvPr>
+            <p:ph type="subTitle" idx="1"/>
+          </p:nvPr>
+        </p:nvSpPr>
+        <p:spPr/>
+        <p:txBody>
+          <a:bodyPr/>
+          <a:lstStyle/>
+          <a:p>
+            <a:r>
+              <a:rPr lang="hu-HU" dirty="0"/>
+              <a:t>Készítette:</a:t>
+            </a:r>
+            <a:r>
+              <a:rPr lang="en-US" dirty="0"/>
+              <a:t> </a:t>
+            </a:r>
+            <a:r>
+              <a:rPr lang="en-US" dirty="0" err="1"/>
+              <a:t>Ocskó</a:t>
+            </a:r>
+            <a:r>
+              <a:rPr lang="en-US" dirty="0"/>
+              <a:t> </a:t>
+            </a:r>
+            <a:r>
+              <a:rPr lang="en-US" dirty="0" err="1"/>
+              <a:t>Gábor</a:t>
+            </a:r>
+            <a:endParaRPr lang="hu-HU" dirty="0"/>
+          </a:p>
+        </p:txBody>
+      </p:sp>
+    </p:spTree>
+    <p:extLst>
+      <p:ext uri="{BB962C8B-B14F-4D97-AF65-F5344CB8AC3E}">
+        <p14:creationId xmlns:p14="http://schemas.microsoft.com/office/powerpoint/2010/main" val="4272366772"/>
+      </p:ext>
+    </p:extLst>
+  </p:cSld>
+  <p:clrMapOvr>
+    <a:masterClrMapping/>
+  </p:clrMapOvr>
+</p:sld>
+</file>
+
+<file path=ppt/slides/slide31.xml><?xml version="1.0" encoding="utf-8"?>
+<p:sld xmlns:a="http://schemas.openxmlformats.org/drawingml/2006/main" xmlns:r="http://schemas.openxmlformats.org/officeDocument/2006/relationships" xmlns:p="http://schemas.openxmlformats.org/presentationml/2006/main">
+  <p:cSld>
+    <p:spTree>
+      <p:nvGrpSpPr>
+        <p:cNvPr id="1" name=""/>
+        <p:cNvGrpSpPr/>
+        <p:nvPr/>
+      </p:nvGrpSpPr>
+      <p:grpSpPr>
+        <a:xfrm>
+          <a:off x="0" y="0"/>
+          <a:ext cx="0" cy="0"/>
+          <a:chOff x="0" y="0"/>
+          <a:chExt cx="0" cy="0"/>
+        </a:xfrm>
+      </p:grpSpPr>
+      <p:sp>
+        <p:nvSpPr>
+          <p:cNvPr id="2" name="Cím 1">
+            <a:extLst>
+              <a:ext uri="{FF2B5EF4-FFF2-40B4-BE49-F238E27FC236}">
+                <a16:creationId xmlns:a16="http://schemas.microsoft.com/office/drawing/2014/main" id="{1787CE07-2703-4852-A509-E6D81D6B9DBE}"/>
+              </a:ext>
+            </a:extLst>
+          </p:cNvPr>
+          <p:cNvSpPr>
+            <a:spLocks noGrp="1"/>
+          </p:cNvSpPr>
+          <p:nvPr>
+            <p:ph type="title"/>
+          </p:nvPr>
+        </p:nvSpPr>
+        <p:spPr/>
+        <p:txBody>
+          <a:bodyPr/>
+          <a:lstStyle/>
+          <a:p>
+            <a:endParaRPr lang="hu-HU"/>
+          </a:p>
+        </p:txBody>
+      </p:sp>
+      <p:sp>
+        <p:nvSpPr>
+          <p:cNvPr id="3" name="Szöveg helye 2">
+            <a:extLst>
+              <a:ext uri="{FF2B5EF4-FFF2-40B4-BE49-F238E27FC236}">
+                <a16:creationId xmlns:a16="http://schemas.microsoft.com/office/drawing/2014/main" id="{FB894463-B3B6-436F-A19C-1EDC4EBABF35}"/>
+              </a:ext>
+            </a:extLst>
+          </p:cNvPr>
+          <p:cNvSpPr>
+            <a:spLocks noGrp="1"/>
+          </p:cNvSpPr>
+          <p:nvPr>
+            <p:ph type="body" idx="1"/>
+          </p:nvPr>
+        </p:nvSpPr>
+        <p:spPr/>
+        <p:txBody>
+          <a:bodyPr/>
+          <a:lstStyle/>
+          <a:p>
+            <a:endParaRPr lang="hu-HU"/>
+          </a:p>
+        </p:txBody>
+      </p:sp>
+    </p:spTree>
+    <p:extLst>
+      <p:ext uri="{BB962C8B-B14F-4D97-AF65-F5344CB8AC3E}">
+        <p14:creationId xmlns:p14="http://schemas.microsoft.com/office/powerpoint/2010/main" val="3942466986"/>
+      </p:ext>
+    </p:extLst>
+  </p:cSld>
+  <p:clrMapOvr>
+    <a:masterClrMapping/>
+  </p:clrMapOvr>
+</p:sld>
+</file>
+
+<file path=ppt/slides/slide32.xml><?xml version="1.0" encoding="utf-8"?>
+<p:sld xmlns:a="http://schemas.openxmlformats.org/drawingml/2006/main" xmlns:r="http://schemas.openxmlformats.org/officeDocument/2006/relationships" xmlns:p="http://schemas.openxmlformats.org/presentationml/2006/main">
+  <p:cSld>
+    <p:spTree>
+      <p:nvGrpSpPr>
+        <p:cNvPr id="1" name=""/>
+        <p:cNvGrpSpPr/>
+        <p:nvPr/>
+      </p:nvGrpSpPr>
+      <p:grpSpPr>
+        <a:xfrm>
+          <a:off x="0" y="0"/>
+          <a:ext cx="0" cy="0"/>
+          <a:chOff x="0" y="0"/>
+          <a:chExt cx="0" cy="0"/>
+        </a:xfrm>
+      </p:grpSpPr>
+      <p:sp>
+        <p:nvSpPr>
+          <p:cNvPr id="2" name="Cím 1">
+            <a:extLst>
+              <a:ext uri="{FF2B5EF4-FFF2-40B4-BE49-F238E27FC236}">
+                <a16:creationId xmlns:a16="http://schemas.microsoft.com/office/drawing/2014/main" id="{6DD01941-CA86-4F4A-9115-275D5F8C3E85}"/>
+              </a:ext>
+            </a:extLst>
+          </p:cNvPr>
+          <p:cNvSpPr>
+            <a:spLocks noGrp="1"/>
+          </p:cNvSpPr>
+          <p:nvPr>
+            <p:ph type="ctrTitle"/>
+          </p:nvPr>
+        </p:nvSpPr>
+        <p:spPr/>
+        <p:txBody>
+          <a:bodyPr/>
+          <a:lstStyle/>
+          <a:p>
+            <a:r>
+              <a:rPr lang="hu-HU" dirty="0"/>
+              <a:t>Szolnok Wifi alhálózat konfigurálása</a:t>
+            </a:r>
+          </a:p>
+        </p:txBody>
+      </p:sp>
+      <p:sp>
+        <p:nvSpPr>
+          <p:cNvPr id="3" name="Alcím 2">
+            <a:extLst>
+              <a:ext uri="{FF2B5EF4-FFF2-40B4-BE49-F238E27FC236}">
+                <a16:creationId xmlns:a16="http://schemas.microsoft.com/office/drawing/2014/main" id="{94DE4DFE-308A-418E-9484-A5A006A9CF66}"/>
+              </a:ext>
+            </a:extLst>
+          </p:cNvPr>
+          <p:cNvSpPr>
+            <a:spLocks noGrp="1"/>
+          </p:cNvSpPr>
+          <p:nvPr>
+            <p:ph type="subTitle" idx="1"/>
+          </p:nvPr>
+        </p:nvSpPr>
+        <p:spPr/>
+        <p:txBody>
+          <a:bodyPr/>
+          <a:lstStyle/>
+          <a:p>
+            <a:r>
+              <a:rPr lang="hu-HU" dirty="0"/>
+              <a:t>Készítette: </a:t>
+            </a:r>
+            <a:r>
+              <a:rPr lang="en-US" dirty="0"/>
+              <a:t>Kómár Attila</a:t>
+            </a:r>
+            <a:endParaRPr lang="hu-HU" dirty="0"/>
+          </a:p>
+        </p:txBody>
+      </p:sp>
+    </p:spTree>
+    <p:extLst>
+      <p:ext uri="{BB962C8B-B14F-4D97-AF65-F5344CB8AC3E}">
+        <p14:creationId xmlns:p14="http://schemas.microsoft.com/office/powerpoint/2010/main" val="1092992640"/>
+      </p:ext>
+    </p:extLst>
+  </p:cSld>
+  <p:clrMapOvr>
+    <a:masterClrMapping/>
+  </p:clrMapOvr>
+</p:sld>
+</file>
+
+<file path=ppt/slides/slide33.xml><?xml version="1.0" encoding="utf-8"?>
+<p:sld xmlns:a="http://schemas.openxmlformats.org/drawingml/2006/main" xmlns:r="http://schemas.openxmlformats.org/officeDocument/2006/relationships" xmlns:p="http://schemas.openxmlformats.org/presentationml/2006/main">
+  <p:cSld>
+    <p:spTree>
+      <p:nvGrpSpPr>
+        <p:cNvPr id="1" name=""/>
+        <p:cNvGrpSpPr/>
+        <p:nvPr/>
+      </p:nvGrpSpPr>
+      <p:grpSpPr>
+        <a:xfrm>
+          <a:off x="0" y="0"/>
+          <a:ext cx="0" cy="0"/>
+          <a:chOff x="0" y="0"/>
+          <a:chExt cx="0" cy="0"/>
+        </a:xfrm>
+      </p:grpSpPr>
+      <p:sp>
+        <p:nvSpPr>
+          <p:cNvPr id="2" name="Cím 1">
+            <a:extLst>
+              <a:ext uri="{FF2B5EF4-FFF2-40B4-BE49-F238E27FC236}">
+                <a16:creationId xmlns:a16="http://schemas.microsoft.com/office/drawing/2014/main" id="{58931070-5E8E-4C9F-BFCC-2CD48CBA311A}"/>
+              </a:ext>
+            </a:extLst>
+          </p:cNvPr>
+          <p:cNvSpPr>
+            <a:spLocks noGrp="1"/>
+          </p:cNvSpPr>
+          <p:nvPr>
+            <p:ph type="title"/>
+          </p:nvPr>
+        </p:nvSpPr>
+        <p:spPr/>
+        <p:txBody>
+          <a:bodyPr/>
+          <a:lstStyle/>
+          <a:p>
+            <a:pPr algn="ctr"/>
+            <a:r>
+              <a:rPr lang="en-US" dirty="0" err="1"/>
+              <a:t>Topológia</a:t>
+            </a:r>
+            <a:endParaRPr lang="hu-HU" dirty="0"/>
+          </a:p>
+        </p:txBody>
+      </p:sp>
+      <p:pic>
+        <p:nvPicPr>
+          <p:cNvPr id="4" name="Kép 3">
+            <a:extLst>
+              <a:ext uri="{FF2B5EF4-FFF2-40B4-BE49-F238E27FC236}">
+                <a16:creationId xmlns:a16="http://schemas.microsoft.com/office/drawing/2014/main" id="{E387220C-B4C2-4662-9E4A-1775234170FF}"/>
+              </a:ext>
+            </a:extLst>
+          </p:cNvPr>
+          <p:cNvPicPr>
+            <a:picLocks noChangeAspect="1"/>
+          </p:cNvPicPr>
+          <p:nvPr/>
+        </p:nvPicPr>
+        <p:blipFill>
+          <a:blip r:embed="rId2"/>
+          <a:stretch>
+            <a:fillRect/>
+          </a:stretch>
+        </p:blipFill>
+        <p:spPr>
+          <a:xfrm>
+            <a:off x="3364907" y="1333355"/>
+            <a:ext cx="5462185" cy="5704949"/>
+          </a:xfrm>
+          <a:prstGeom prst="rect">
+            <a:avLst/>
+          </a:prstGeom>
+        </p:spPr>
+      </p:pic>
+    </p:spTree>
+    <p:extLst>
+      <p:ext uri="{BB962C8B-B14F-4D97-AF65-F5344CB8AC3E}">
+        <p14:creationId xmlns:p14="http://schemas.microsoft.com/office/powerpoint/2010/main" val="1336100481"/>
+      </p:ext>
+    </p:extLst>
+  </p:cSld>
+  <p:clrMapOvr>
+    <a:masterClrMapping/>
+  </p:clrMapOvr>
+</p:sld>
+</file>
+
+<file path=ppt/slides/slide34.xml><?xml version="1.0" encoding="utf-8"?>
+<p:sld xmlns:a="http://schemas.openxmlformats.org/drawingml/2006/main" xmlns:r="http://schemas.openxmlformats.org/officeDocument/2006/relationships" xmlns:p="http://schemas.openxmlformats.org/presentationml/2006/main">
+  <p:cSld>
+    <p:spTree>
+      <p:nvGrpSpPr>
+        <p:cNvPr id="1" name=""/>
+        <p:cNvGrpSpPr/>
+        <p:nvPr/>
+      </p:nvGrpSpPr>
+      <p:grpSpPr>
+        <a:xfrm>
+          <a:off x="0" y="0"/>
+          <a:ext cx="0" cy="0"/>
+          <a:chOff x="0" y="0"/>
+          <a:chExt cx="0" cy="0"/>
+        </a:xfrm>
+      </p:grpSpPr>
+      <p:sp>
+        <p:nvSpPr>
+          <p:cNvPr id="2" name="Cím 1">
+            <a:extLst>
+              <a:ext uri="{FF2B5EF4-FFF2-40B4-BE49-F238E27FC236}">
+                <a16:creationId xmlns:a16="http://schemas.microsoft.com/office/drawing/2014/main" id="{D7401370-94F4-4DB4-854C-C219618F3E4F}"/>
+              </a:ext>
+            </a:extLst>
+          </p:cNvPr>
+          <p:cNvSpPr>
+            <a:spLocks noGrp="1"/>
+          </p:cNvSpPr>
+          <p:nvPr>
+            <p:ph type="title"/>
+          </p:nvPr>
+        </p:nvSpPr>
+        <p:spPr/>
+        <p:txBody>
+          <a:bodyPr/>
+          <a:lstStyle/>
+          <a:p>
+            <a:pPr algn="ctr"/>
+            <a:r>
+              <a:rPr lang="en-US" dirty="0"/>
+              <a:t>IP </a:t>
+            </a:r>
+            <a:r>
+              <a:rPr lang="en-US" dirty="0" err="1"/>
+              <a:t>címek</a:t>
+            </a:r>
+            <a:endParaRPr lang="hu-HU" dirty="0"/>
+          </a:p>
+        </p:txBody>
+      </p:sp>
+      <p:sp>
+        <p:nvSpPr>
+          <p:cNvPr id="3" name="Szöveg helye 2">
+            <a:extLst>
+              <a:ext uri="{FF2B5EF4-FFF2-40B4-BE49-F238E27FC236}">
+                <a16:creationId xmlns:a16="http://schemas.microsoft.com/office/drawing/2014/main" id="{6242ACDA-A0F2-4602-9E9B-ACA91E8D5A1E}"/>
+              </a:ext>
+            </a:extLst>
+          </p:cNvPr>
+          <p:cNvSpPr>
+            <a:spLocks noGrp="1"/>
+          </p:cNvSpPr>
+          <p:nvPr>
+            <p:ph type="body" idx="1"/>
+          </p:nvPr>
+        </p:nvSpPr>
+        <p:spPr/>
+        <p:txBody>
+          <a:bodyPr/>
+          <a:lstStyle/>
+          <a:p>
+            <a:pPr algn="ctr"/>
+            <a:r>
+              <a:rPr lang="en-US" dirty="0" err="1"/>
+              <a:t>Nyomtató</a:t>
+            </a:r>
+            <a:r>
+              <a:rPr lang="en-US" dirty="0"/>
+              <a:t>: 192.168.10.2</a:t>
+            </a:r>
+          </a:p>
+          <a:p>
+            <a:pPr algn="ctr"/>
+            <a:r>
+              <a:rPr lang="en-US" dirty="0"/>
+              <a:t>PC: 192.168.10.3</a:t>
+            </a:r>
+            <a:endParaRPr lang="hu-HU" dirty="0"/>
+          </a:p>
+        </p:txBody>
+      </p:sp>
+      <p:pic>
+        <p:nvPicPr>
+          <p:cNvPr id="4" name="Kép 3">
+            <a:extLst>
+              <a:ext uri="{FF2B5EF4-FFF2-40B4-BE49-F238E27FC236}">
+                <a16:creationId xmlns:a16="http://schemas.microsoft.com/office/drawing/2014/main" id="{44873B98-7C88-4E20-997F-312D1D1815D5}"/>
+              </a:ext>
+            </a:extLst>
+          </p:cNvPr>
+          <p:cNvPicPr>
+            <a:picLocks noChangeAspect="1"/>
+          </p:cNvPicPr>
+          <p:nvPr/>
+        </p:nvPicPr>
+        <p:blipFill>
+          <a:blip r:embed="rId2"/>
+          <a:stretch>
+            <a:fillRect/>
+          </a:stretch>
+        </p:blipFill>
+        <p:spPr>
+          <a:xfrm>
+            <a:off x="2966970" y="3097249"/>
+            <a:ext cx="6258060" cy="1887552"/>
+          </a:xfrm>
+          <a:prstGeom prst="rect">
+            <a:avLst/>
+          </a:prstGeom>
+        </p:spPr>
+      </p:pic>
+      <p:pic>
+        <p:nvPicPr>
+          <p:cNvPr id="5" name="Kép 4">
+            <a:extLst>
+              <a:ext uri="{FF2B5EF4-FFF2-40B4-BE49-F238E27FC236}">
+                <a16:creationId xmlns:a16="http://schemas.microsoft.com/office/drawing/2014/main" id="{8F5BFAF1-D152-4E6C-8C16-2F149C5E0A05}"/>
+              </a:ext>
+            </a:extLst>
+          </p:cNvPr>
+          <p:cNvPicPr>
+            <a:picLocks noChangeAspect="1"/>
+          </p:cNvPicPr>
+          <p:nvPr/>
+        </p:nvPicPr>
+        <p:blipFill>
+          <a:blip r:embed="rId3"/>
+          <a:stretch>
+            <a:fillRect/>
+          </a:stretch>
+        </p:blipFill>
+        <p:spPr>
+          <a:xfrm>
+            <a:off x="2966970" y="4984801"/>
+            <a:ext cx="6258060" cy="1327099"/>
+          </a:xfrm>
+          <a:prstGeom prst="rect">
+            <a:avLst/>
+          </a:prstGeom>
+        </p:spPr>
+      </p:pic>
+    </p:spTree>
+    <p:extLst>
+      <p:ext uri="{BB962C8B-B14F-4D97-AF65-F5344CB8AC3E}">
+        <p14:creationId xmlns:p14="http://schemas.microsoft.com/office/powerpoint/2010/main" val="757688267"/>
+      </p:ext>
+    </p:extLst>
+  </p:cSld>
+  <p:clrMapOvr>
+    <a:masterClrMapping/>
+  </p:clrMapOvr>
+</p:sld>
+</file>
+
+<file path=ppt/slides/slide35.xml><?xml version="1.0" encoding="utf-8"?>
+<p:sld xmlns:a="http://schemas.openxmlformats.org/drawingml/2006/main" xmlns:r="http://schemas.openxmlformats.org/officeDocument/2006/relationships" xmlns:p="http://schemas.openxmlformats.org/presentationml/2006/main">
+  <p:cSld>
+    <p:spTree>
+      <p:nvGrpSpPr>
+        <p:cNvPr id="1" name=""/>
+        <p:cNvGrpSpPr/>
+        <p:nvPr/>
+      </p:nvGrpSpPr>
+      <p:grpSpPr>
+        <a:xfrm>
+          <a:off x="0" y="0"/>
+          <a:ext cx="0" cy="0"/>
+          <a:chOff x="0" y="0"/>
+          <a:chExt cx="0" cy="0"/>
+        </a:xfrm>
+      </p:grpSpPr>
+      <p:sp>
+        <p:nvSpPr>
+          <p:cNvPr id="2" name="Cím 1">
+            <a:extLst>
+              <a:ext uri="{FF2B5EF4-FFF2-40B4-BE49-F238E27FC236}">
+                <a16:creationId xmlns:a16="http://schemas.microsoft.com/office/drawing/2014/main" id="{5218BF9F-517C-4C85-BA4C-BE8B825D9BE3}"/>
+              </a:ext>
+            </a:extLst>
+          </p:cNvPr>
+          <p:cNvSpPr>
+            <a:spLocks noGrp="1"/>
+          </p:cNvSpPr>
+          <p:nvPr>
+            <p:ph type="title"/>
+          </p:nvPr>
+        </p:nvSpPr>
+        <p:spPr/>
+        <p:txBody>
+          <a:bodyPr/>
+          <a:lstStyle/>
+          <a:p>
+            <a:pPr algn="ctr"/>
+            <a:r>
+              <a:rPr lang="en-US" dirty="0" err="1"/>
+              <a:t>Wifi</a:t>
+            </a:r>
+            <a:r>
+              <a:rPr lang="en-US" dirty="0"/>
+              <a:t> Setup</a:t>
+            </a:r>
+            <a:endParaRPr lang="hu-HU" dirty="0"/>
+          </a:p>
+        </p:txBody>
+      </p:sp>
+      <p:pic>
+        <p:nvPicPr>
+          <p:cNvPr id="5" name="Kép 4">
+            <a:extLst>
+              <a:ext uri="{FF2B5EF4-FFF2-40B4-BE49-F238E27FC236}">
+                <a16:creationId xmlns:a16="http://schemas.microsoft.com/office/drawing/2014/main" id="{5C4E0F25-530B-4E3D-900F-5F9CAA80FB03}"/>
+              </a:ext>
+            </a:extLst>
+          </p:cNvPr>
+          <p:cNvPicPr>
+            <a:picLocks noChangeAspect="1"/>
+          </p:cNvPicPr>
+          <p:nvPr/>
+        </p:nvPicPr>
+        <p:blipFill>
+          <a:blip r:embed="rId2"/>
+          <a:stretch>
+            <a:fillRect/>
+          </a:stretch>
+        </p:blipFill>
+        <p:spPr>
+          <a:xfrm>
+            <a:off x="2214924" y="1825625"/>
+            <a:ext cx="7762151" cy="4351338"/>
+          </a:xfrm>
+          <a:prstGeom prst="rect">
+            <a:avLst/>
+          </a:prstGeom>
+        </p:spPr>
+      </p:pic>
+    </p:spTree>
+    <p:extLst>
+      <p:ext uri="{BB962C8B-B14F-4D97-AF65-F5344CB8AC3E}">
+        <p14:creationId xmlns:p14="http://schemas.microsoft.com/office/powerpoint/2010/main" val="2765736999"/>
+      </p:ext>
+    </p:extLst>
+  </p:cSld>
+  <p:clrMapOvr>
+    <a:masterClrMapping/>
+  </p:clrMapOvr>
+</p:sld>
+</file>
+
+<file path=ppt/slides/slide36.xml><?xml version="1.0" encoding="utf-8"?>
+<p:sld xmlns:a="http://schemas.openxmlformats.org/drawingml/2006/main" xmlns:r="http://schemas.openxmlformats.org/officeDocument/2006/relationships" xmlns:p="http://schemas.openxmlformats.org/presentationml/2006/main">
+  <p:cSld>
+    <p:spTree>
+      <p:nvGrpSpPr>
+        <p:cNvPr id="1" name=""/>
+        <p:cNvGrpSpPr/>
+        <p:nvPr/>
+      </p:nvGrpSpPr>
+      <p:grpSpPr>
+        <a:xfrm>
+          <a:off x="0" y="0"/>
+          <a:ext cx="0" cy="0"/>
+          <a:chOff x="0" y="0"/>
+          <a:chExt cx="0" cy="0"/>
+        </a:xfrm>
+      </p:grpSpPr>
+      <p:sp>
+        <p:nvSpPr>
+          <p:cNvPr id="2" name="Cím 1">
+            <a:extLst>
+              <a:ext uri="{FF2B5EF4-FFF2-40B4-BE49-F238E27FC236}">
+                <a16:creationId xmlns:a16="http://schemas.microsoft.com/office/drawing/2014/main" id="{06ABD53D-D89B-4F8C-8CC9-D6DBC9865E9F}"/>
+              </a:ext>
+            </a:extLst>
+          </p:cNvPr>
+          <p:cNvSpPr>
+            <a:spLocks noGrp="1"/>
+          </p:cNvSpPr>
+          <p:nvPr>
+            <p:ph type="title"/>
+          </p:nvPr>
+        </p:nvSpPr>
+        <p:spPr/>
+        <p:txBody>
+          <a:bodyPr/>
+          <a:lstStyle/>
+          <a:p>
+            <a:pPr algn="ctr"/>
+            <a:r>
+              <a:rPr lang="en-US" dirty="0" err="1"/>
+              <a:t>Wifi</a:t>
+            </a:r>
+            <a:r>
+              <a:rPr lang="en-US" dirty="0"/>
+              <a:t> Wireless</a:t>
+            </a:r>
+            <a:endParaRPr lang="hu-HU" dirty="0"/>
+          </a:p>
+        </p:txBody>
+      </p:sp>
+      <p:pic>
+        <p:nvPicPr>
+          <p:cNvPr id="4" name="Kép 3">
+            <a:extLst>
+              <a:ext uri="{FF2B5EF4-FFF2-40B4-BE49-F238E27FC236}">
+                <a16:creationId xmlns:a16="http://schemas.microsoft.com/office/drawing/2014/main" id="{9069F2D3-1765-4661-9C96-5C9C467D3A1F}"/>
+              </a:ext>
+            </a:extLst>
+          </p:cNvPr>
+          <p:cNvPicPr>
+            <a:picLocks noChangeAspect="1"/>
+          </p:cNvPicPr>
+          <p:nvPr/>
+        </p:nvPicPr>
+        <p:blipFill>
+          <a:blip r:embed="rId2"/>
+          <a:stretch>
+            <a:fillRect/>
+          </a:stretch>
+        </p:blipFill>
+        <p:spPr>
+          <a:xfrm>
+            <a:off x="353711" y="1505393"/>
+            <a:ext cx="5201376" cy="4991797"/>
+          </a:xfrm>
+          <a:prstGeom prst="rect">
+            <a:avLst/>
+          </a:prstGeom>
+        </p:spPr>
+      </p:pic>
+      <p:pic>
+        <p:nvPicPr>
+          <p:cNvPr id="5" name="Kép 4">
+            <a:extLst>
+              <a:ext uri="{FF2B5EF4-FFF2-40B4-BE49-F238E27FC236}">
+                <a16:creationId xmlns:a16="http://schemas.microsoft.com/office/drawing/2014/main" id="{2C2A9B77-34BF-4E82-8434-2F44A97103F8}"/>
+              </a:ext>
+            </a:extLst>
+          </p:cNvPr>
+          <p:cNvPicPr>
+            <a:picLocks noChangeAspect="1"/>
+          </p:cNvPicPr>
+          <p:nvPr/>
+        </p:nvPicPr>
+        <p:blipFill>
+          <a:blip r:embed="rId3"/>
+          <a:stretch>
+            <a:fillRect/>
+          </a:stretch>
+        </p:blipFill>
+        <p:spPr>
+          <a:xfrm>
+            <a:off x="5786907" y="3213117"/>
+            <a:ext cx="5914098" cy="1576347"/>
+          </a:xfrm>
+          <a:prstGeom prst="rect">
+            <a:avLst/>
+          </a:prstGeom>
+        </p:spPr>
+      </p:pic>
+    </p:spTree>
+    <p:extLst>
+      <p:ext uri="{BB962C8B-B14F-4D97-AF65-F5344CB8AC3E}">
+        <p14:creationId xmlns:p14="http://schemas.microsoft.com/office/powerpoint/2010/main" val="1845875926"/>
+      </p:ext>
+    </p:extLst>
+  </p:cSld>
+  <p:clrMapOvr>
+    <a:masterClrMapping/>
+  </p:clrMapOvr>
+</p:sld>
+</file>
+
+<file path=ppt/slides/slide37.xml><?xml version="1.0" encoding="utf-8"?>
+<p:sld xmlns:a="http://schemas.openxmlformats.org/drawingml/2006/main" xmlns:r="http://schemas.openxmlformats.org/officeDocument/2006/relationships" xmlns:p="http://schemas.openxmlformats.org/presentationml/2006/main">
+  <p:cSld>
+    <p:spTree>
+      <p:nvGrpSpPr>
+        <p:cNvPr id="1" name=""/>
+        <p:cNvGrpSpPr/>
+        <p:nvPr/>
+      </p:nvGrpSpPr>
+      <p:grpSpPr>
+        <a:xfrm>
+          <a:off x="0" y="0"/>
+          <a:ext cx="0" cy="0"/>
+          <a:chOff x="0" y="0"/>
+          <a:chExt cx="0" cy="0"/>
+        </a:xfrm>
+      </p:grpSpPr>
+      <p:sp>
+        <p:nvSpPr>
+          <p:cNvPr id="2" name="Cím 1">
+            <a:extLst>
+              <a:ext uri="{FF2B5EF4-FFF2-40B4-BE49-F238E27FC236}">
+                <a16:creationId xmlns:a16="http://schemas.microsoft.com/office/drawing/2014/main" id="{348482F7-0B1B-4103-9EF9-0CADC66F7E36}"/>
+              </a:ext>
+            </a:extLst>
+          </p:cNvPr>
+          <p:cNvSpPr>
+            <a:spLocks noGrp="1"/>
+          </p:cNvSpPr>
+          <p:nvPr>
+            <p:ph type="title"/>
+          </p:nvPr>
+        </p:nvSpPr>
+        <p:spPr/>
+        <p:txBody>
+          <a:bodyPr/>
+          <a:lstStyle/>
+          <a:p>
+            <a:pPr algn="ctr"/>
+            <a:r>
+              <a:rPr lang="en-US" dirty="0" err="1"/>
+              <a:t>Vezeték</a:t>
+            </a:r>
+            <a:r>
+              <a:rPr lang="en-US" dirty="0"/>
+              <a:t> </a:t>
+            </a:r>
+            <a:r>
+              <a:rPr lang="en-US" dirty="0" err="1"/>
+              <a:t>nélküli</a:t>
+            </a:r>
+            <a:r>
+              <a:rPr lang="en-US" dirty="0"/>
+              <a:t> </a:t>
+            </a:r>
+            <a:r>
+              <a:rPr lang="en-US" dirty="0" err="1"/>
+              <a:t>eszközök</a:t>
+            </a:r>
+            <a:endParaRPr lang="hu-HU" dirty="0"/>
+          </a:p>
+        </p:txBody>
+      </p:sp>
+      <p:pic>
+        <p:nvPicPr>
+          <p:cNvPr id="4" name="Kép 3">
+            <a:extLst>
+              <a:ext uri="{FF2B5EF4-FFF2-40B4-BE49-F238E27FC236}">
+                <a16:creationId xmlns:a16="http://schemas.microsoft.com/office/drawing/2014/main" id="{A34E1043-E03E-4D8A-AEB9-418C04BDFDA1}"/>
+              </a:ext>
+            </a:extLst>
+          </p:cNvPr>
+          <p:cNvPicPr>
+            <a:picLocks noChangeAspect="1"/>
+          </p:cNvPicPr>
+          <p:nvPr/>
+        </p:nvPicPr>
+        <p:blipFill>
+          <a:blip r:embed="rId2"/>
+          <a:stretch>
+            <a:fillRect/>
+          </a:stretch>
+        </p:blipFill>
+        <p:spPr>
+          <a:xfrm>
+            <a:off x="3204462" y="1566315"/>
+            <a:ext cx="5783076" cy="4869958"/>
+          </a:xfrm>
+          <a:prstGeom prst="rect">
+            <a:avLst/>
+          </a:prstGeom>
+        </p:spPr>
+      </p:pic>
+    </p:spTree>
+    <p:extLst>
+      <p:ext uri="{BB962C8B-B14F-4D97-AF65-F5344CB8AC3E}">
+        <p14:creationId xmlns:p14="http://schemas.microsoft.com/office/powerpoint/2010/main" val="2053570042"/>
+      </p:ext>
+    </p:extLst>
+  </p:cSld>
+  <p:clrMapOvr>
+    <a:masterClrMapping/>
+  </p:clrMapOvr>
+</p:sld>
+</file>
+
+<file path=ppt/slides/slide38.xml><?xml version="1.0" encoding="utf-8"?>
+<p:sld xmlns:a="http://schemas.openxmlformats.org/drawingml/2006/main" xmlns:r="http://schemas.openxmlformats.org/officeDocument/2006/relationships" xmlns:p="http://schemas.openxmlformats.org/presentationml/2006/main">
+  <p:cSld>
+    <p:spTree>
+      <p:nvGrpSpPr>
         <p:cNvPr id="1" name="Shape 258"/>
         <p:cNvGrpSpPr/>
         <p:nvPr/>

</xml_diff>

<commit_message>
szeged, ikso és hálózat ellenőrzés megcsinálva
</commit_message>
<xml_diff>
--- a/Prezentációk/School_projects_ppt.pptx
+++ b/Prezentációk/School_projects_ppt.pptx
@@ -5,7 +5,7 @@
     <p:sldMasterId id="2147483648" r:id="rId1"/>
   </p:sldMasterIdLst>
   <p:notesMasterIdLst>
-    <p:notesMasterId r:id="rId40"/>
+    <p:notesMasterId r:id="rId54"/>
   </p:notesMasterIdLst>
   <p:sldIdLst>
     <p:sldId id="256" r:id="rId2"/>
@@ -39,13 +39,27 @@
     <p:sldId id="285" r:id="rId30"/>
     <p:sldId id="286" r:id="rId31"/>
     <p:sldId id="289" r:id="rId32"/>
-    <p:sldId id="287" r:id="rId33"/>
-    <p:sldId id="288" r:id="rId34"/>
-    <p:sldId id="290" r:id="rId35"/>
-    <p:sldId id="291" r:id="rId36"/>
-    <p:sldId id="292" r:id="rId37"/>
-    <p:sldId id="293" r:id="rId38"/>
-    <p:sldId id="280" r:id="rId39"/>
+    <p:sldId id="294" r:id="rId33"/>
+    <p:sldId id="295" r:id="rId34"/>
+    <p:sldId id="296" r:id="rId35"/>
+    <p:sldId id="297" r:id="rId36"/>
+    <p:sldId id="298" r:id="rId37"/>
+    <p:sldId id="287" r:id="rId38"/>
+    <p:sldId id="288" r:id="rId39"/>
+    <p:sldId id="290" r:id="rId40"/>
+    <p:sldId id="291" r:id="rId41"/>
+    <p:sldId id="292" r:id="rId42"/>
+    <p:sldId id="293" r:id="rId43"/>
+    <p:sldId id="299" r:id="rId44"/>
+    <p:sldId id="300" r:id="rId45"/>
+    <p:sldId id="301" r:id="rId46"/>
+    <p:sldId id="302" r:id="rId47"/>
+    <p:sldId id="303" r:id="rId48"/>
+    <p:sldId id="304" r:id="rId49"/>
+    <p:sldId id="305" r:id="rId50"/>
+    <p:sldId id="306" r:id="rId51"/>
+    <p:sldId id="307" r:id="rId52"/>
+    <p:sldId id="280" r:id="rId53"/>
   </p:sldIdLst>
   <p:sldSz cx="12192000" cy="6858000"/>
   <p:notesSz cx="6858000" cy="9144000"/>
@@ -283,10 +297,18 @@
       <p15:sldGuideLst xmlns:p15="http://schemas.microsoft.com/office/powerpoint/2012/main"/>
     </p:ext>
     <p:ext uri="http://customooxmlschemas.google.com/">
-      <go:slidesCustomData xmlns="" xmlns:mc="http://schemas.openxmlformats.org/markup-compatibility/2006" xmlns:mv="urn:schemas-microsoft-com:mac:vml" xmlns:c="http://schemas.openxmlformats.org/drawingml/2006/chart" xmlns:dgm="http://schemas.openxmlformats.org/drawingml/2006/diagram" xmlns:o="urn:schemas-microsoft-com:office:office" xmlns:v="urn:schemas-microsoft-com:vml" xmlns:pvml="urn:schemas-microsoft-com:office:powerpoint" xmlns:com="http://schemas.openxmlformats.org/drawingml/2006/compatibility" xmlns:p14="http://schemas.microsoft.com/office/powerpoint/2010/main" xmlns:p15="http://schemas.microsoft.com/office/powerpoint/2012/main" xmlns:ahyp="http://schemas.microsoft.com/office/drawing/2018/hyperlinkcolor" xmlns:go="http://customooxmlschemas.google.com/" r:id="rId41" roundtripDataSignature="AMtx7mh4tgGCVRmDJL4jUWD9jkarnXnmPQ=="/>
+      <go:slidesCustomData xmlns:go="http://customooxmlschemas.google.com/" xmlns:ahyp="http://schemas.microsoft.com/office/drawing/2018/hyperlinkcolor" xmlns:p15="http://schemas.microsoft.com/office/powerpoint/2012/main" xmlns:p14="http://schemas.microsoft.com/office/powerpoint/2010/main" xmlns:com="http://schemas.openxmlformats.org/drawingml/2006/compatibility" xmlns:pvml="urn:schemas-microsoft-com:office:powerpoint" xmlns:v="urn:schemas-microsoft-com:vml" xmlns:o="urn:schemas-microsoft-com:office:office" xmlns:dgm="http://schemas.openxmlformats.org/drawingml/2006/diagram" xmlns:c="http://schemas.openxmlformats.org/drawingml/2006/chart" xmlns:mv="urn:schemas-microsoft-com:mac:vml" xmlns:mc="http://schemas.openxmlformats.org/markup-compatibility/2006" xmlns="" r:id="rId55" roundtripDataSignature="AMtx7mh4tgGCVRmDJL4jUWD9jkarnXnmPQ=="/>
     </p:ext>
   </p:extLst>
 </p:presentation>
+</file>
+
+<file path=ppt/revisionInfo.xml><?xml version="1.0" encoding="utf-8"?>
+<p1510:revInfo xmlns:a="http://schemas.openxmlformats.org/drawingml/2006/main" xmlns:r="http://schemas.openxmlformats.org/officeDocument/2006/relationships" xmlns:p1510="http://schemas.microsoft.com/office/powerpoint/2015/10/main">
+  <p1510:revLst>
+    <p1510:client id="{5BB938A3-DAED-2D6C-F574-E62D55234E16}" v="706" dt="2022-12-04T19:01:25.957"/>
+  </p1510:revLst>
+</p1510:revInfo>
 </file>
 
 <file path=ppt/notesMasters/notesMaster1.xml><?xml version="1.0" encoding="utf-8"?>
@@ -18866,7 +18888,98 @@
           <a:bodyPr/>
           <a:lstStyle/>
           <a:p>
-            <a:endParaRPr lang="hu-HU"/>
+            <a:r>
+              <a:rPr lang="hu-HU" dirty="0"/>
+              <a:t>Topológia</a:t>
+            </a:r>
+          </a:p>
+        </p:txBody>
+      </p:sp>
+      <p:pic>
+        <p:nvPicPr>
+          <p:cNvPr id="4" name="Kép 4">
+            <a:extLst>
+              <a:ext uri="{FF2B5EF4-FFF2-40B4-BE49-F238E27FC236}">
+                <a16:creationId xmlns:a16="http://schemas.microsoft.com/office/drawing/2014/main" id="{D4384957-B707-B63A-7259-790FB55C864B}"/>
+              </a:ext>
+            </a:extLst>
+          </p:cNvPr>
+          <p:cNvPicPr>
+            <a:picLocks noChangeAspect="1"/>
+          </p:cNvPicPr>
+          <p:nvPr/>
+        </p:nvPicPr>
+        <p:blipFill>
+          <a:blip r:embed="rId2"/>
+          <a:stretch>
+            <a:fillRect/>
+          </a:stretch>
+        </p:blipFill>
+        <p:spPr>
+          <a:xfrm>
+            <a:off x="3331563" y="1674642"/>
+            <a:ext cx="4086068" cy="4464339"/>
+          </a:xfrm>
+          <a:prstGeom prst="rect">
+            <a:avLst/>
+          </a:prstGeom>
+        </p:spPr>
+      </p:pic>
+    </p:spTree>
+    <p:extLst>
+      <p:ext uri="{BB962C8B-B14F-4D97-AF65-F5344CB8AC3E}">
+        <p14:creationId xmlns:p14="http://schemas.microsoft.com/office/powerpoint/2010/main" val="3942466986"/>
+      </p:ext>
+    </p:extLst>
+  </p:cSld>
+  <p:clrMapOvr>
+    <a:masterClrMapping/>
+  </p:clrMapOvr>
+</p:sld>
+</file>
+
+<file path=ppt/slides/slide32.xml><?xml version="1.0" encoding="utf-8"?>
+<p:sld xmlns:a="http://schemas.openxmlformats.org/drawingml/2006/main" xmlns:r="http://schemas.openxmlformats.org/officeDocument/2006/relationships" xmlns:p="http://schemas.openxmlformats.org/presentationml/2006/main">
+  <p:cSld>
+    <p:spTree>
+      <p:nvGrpSpPr>
+        <p:cNvPr id="1" name=""/>
+        <p:cNvGrpSpPr/>
+        <p:nvPr/>
+      </p:nvGrpSpPr>
+      <p:grpSpPr>
+        <a:xfrm>
+          <a:off x="0" y="0"/>
+          <a:ext cx="0" cy="0"/>
+          <a:chOff x="0" y="0"/>
+          <a:chExt cx="0" cy="0"/>
+        </a:xfrm>
+      </p:grpSpPr>
+      <p:sp>
+        <p:nvSpPr>
+          <p:cNvPr id="2" name="Cím 1">
+            <a:extLst>
+              <a:ext uri="{FF2B5EF4-FFF2-40B4-BE49-F238E27FC236}">
+                <a16:creationId xmlns:a16="http://schemas.microsoft.com/office/drawing/2014/main" id="{8B3D2223-6EC9-FBA8-BE93-2A08B8969D96}"/>
+              </a:ext>
+            </a:extLst>
+          </p:cNvPr>
+          <p:cNvSpPr>
+            <a:spLocks noGrp="1"/>
+          </p:cNvSpPr>
+          <p:nvPr>
+            <p:ph type="title"/>
+          </p:nvPr>
+        </p:nvSpPr>
+        <p:spPr/>
+        <p:txBody>
+          <a:bodyPr/>
+          <a:lstStyle/>
+          <a:p>
+            <a:r>
+              <a:rPr lang="hu-HU" dirty="0"/>
+              <a:t>Mit kellett csinálni?</a:t>
+            </a:r>
           </a:p>
         </p:txBody>
       </p:sp>
@@ -18875,7 +18988,7 @@
           <p:cNvPr id="3" name="Szöveg helye 2">
             <a:extLst>
               <a:ext uri="{FF2B5EF4-FFF2-40B4-BE49-F238E27FC236}">
-                <a16:creationId xmlns:a16="http://schemas.microsoft.com/office/drawing/2014/main" id="{FB894463-B3B6-436F-A19C-1EDC4EBABF35}"/>
+                <a16:creationId xmlns:a16="http://schemas.microsoft.com/office/drawing/2014/main" id="{1BA65A07-2DEE-BBE0-F4C2-BCE866A392E7}"/>
               </a:ext>
             </a:extLst>
           </p:cNvPr>
@@ -18891,14 +19004,85 @@
           <a:bodyPr/>
           <a:lstStyle/>
           <a:p>
-            <a:endParaRPr lang="hu-HU"/>
+            <a:r>
+              <a:rPr lang="hu-HU" dirty="0"/>
+              <a:t>Eszközöknek </a:t>
+            </a:r>
+            <a:r>
+              <a:rPr lang="hu-HU" dirty="0" err="1"/>
+              <a:t>ip</a:t>
+            </a:r>
+            <a:r>
+              <a:rPr lang="hu-HU" dirty="0"/>
+              <a:t> cím és </a:t>
+            </a:r>
+            <a:r>
+              <a:rPr lang="hu-HU" dirty="0" err="1"/>
+              <a:t>dns</a:t>
+            </a:r>
+            <a:r>
+              <a:rPr lang="hu-HU" dirty="0"/>
+              <a:t> </a:t>
+            </a:r>
+            <a:r>
+              <a:rPr lang="hu-HU" dirty="0" err="1"/>
+              <a:t>google</a:t>
+            </a:r>
+            <a:r>
+              <a:rPr lang="hu-HU" dirty="0"/>
+              <a:t> felé</a:t>
+            </a:r>
+          </a:p>
+          <a:p>
+            <a:r>
+              <a:rPr lang="hu-HU" dirty="0" err="1"/>
+              <a:t>Switchen</a:t>
+            </a:r>
+            <a:r>
+              <a:rPr lang="hu-HU" dirty="0"/>
+              <a:t> jelszót és telnetet állítani</a:t>
+            </a:r>
+          </a:p>
+          <a:p>
+            <a:r>
+              <a:rPr lang="hu-HU" dirty="0"/>
+              <a:t>A routeren </a:t>
+            </a:r>
+            <a:r>
+              <a:rPr lang="hu-HU" dirty="0" err="1"/>
+              <a:t>ip</a:t>
+            </a:r>
+            <a:r>
+              <a:rPr lang="hu-HU" dirty="0"/>
+              <a:t> címet, átjárót és bejelentkezési üzenetet állítani</a:t>
+            </a:r>
+          </a:p>
+          <a:p>
+            <a:r>
+              <a:rPr lang="hu-HU" dirty="0"/>
+              <a:t>A nap üzenetét beállítani</a:t>
+            </a:r>
+          </a:p>
+          <a:p>
+            <a:r>
+              <a:rPr lang="hu-HU" dirty="0"/>
+              <a:t>Elmenteni a </a:t>
+            </a:r>
+            <a:r>
+              <a:rPr lang="hu-HU" dirty="0" err="1"/>
+              <a:t>konfigot</a:t>
+            </a:r>
+            <a:r>
+              <a:rPr lang="hu-HU" dirty="0"/>
+              <a:t> a TFTP szerverre</a:t>
+            </a:r>
           </a:p>
         </p:txBody>
       </p:sp>
     </p:spTree>
     <p:extLst>
       <p:ext uri="{BB962C8B-B14F-4D97-AF65-F5344CB8AC3E}">
-        <p14:creationId xmlns:p14="http://schemas.microsoft.com/office/powerpoint/2010/main" val="3942466986"/>
+        <p14:creationId xmlns:p14="http://schemas.microsoft.com/office/powerpoint/2010/main" val="1124495124"/>
       </p:ext>
     </p:extLst>
   </p:cSld>
@@ -18908,7 +19092,585 @@
 </p:sld>
 </file>
 
-<file path=ppt/slides/slide32.xml><?xml version="1.0" encoding="utf-8"?>
+<file path=ppt/slides/slide33.xml><?xml version="1.0" encoding="utf-8"?>
+<p:sld xmlns:a="http://schemas.openxmlformats.org/drawingml/2006/main" xmlns:r="http://schemas.openxmlformats.org/officeDocument/2006/relationships" xmlns:p="http://schemas.openxmlformats.org/presentationml/2006/main">
+  <p:cSld>
+    <p:spTree>
+      <p:nvGrpSpPr>
+        <p:cNvPr id="1" name=""/>
+        <p:cNvGrpSpPr/>
+        <p:nvPr/>
+      </p:nvGrpSpPr>
+      <p:grpSpPr>
+        <a:xfrm>
+          <a:off x="0" y="0"/>
+          <a:ext cx="0" cy="0"/>
+          <a:chOff x="0" y="0"/>
+          <a:chExt cx="0" cy="0"/>
+        </a:xfrm>
+      </p:grpSpPr>
+      <p:sp>
+        <p:nvSpPr>
+          <p:cNvPr id="2" name="Cím 1">
+            <a:extLst>
+              <a:ext uri="{FF2B5EF4-FFF2-40B4-BE49-F238E27FC236}">
+                <a16:creationId xmlns:a16="http://schemas.microsoft.com/office/drawing/2014/main" id="{70CA3E98-456F-D7FA-AC13-AFF47CBB329A}"/>
+              </a:ext>
+            </a:extLst>
+          </p:cNvPr>
+          <p:cNvSpPr>
+            <a:spLocks noGrp="1"/>
+          </p:cNvSpPr>
+          <p:nvPr>
+            <p:ph type="title"/>
+          </p:nvPr>
+        </p:nvSpPr>
+        <p:spPr/>
+        <p:txBody>
+          <a:bodyPr/>
+          <a:lstStyle/>
+          <a:p>
+            <a:r>
+              <a:rPr lang="hu-HU" dirty="0"/>
+              <a:t>Megvalósítás</a:t>
+            </a:r>
+          </a:p>
+        </p:txBody>
+      </p:sp>
+      <p:sp>
+        <p:nvSpPr>
+          <p:cNvPr id="3" name="Szöveg helye 2">
+            <a:extLst>
+              <a:ext uri="{FF2B5EF4-FFF2-40B4-BE49-F238E27FC236}">
+                <a16:creationId xmlns:a16="http://schemas.microsoft.com/office/drawing/2014/main" id="{DD09B15F-DA4B-1C17-9E94-0E8296A0BC98}"/>
+              </a:ext>
+            </a:extLst>
+          </p:cNvPr>
+          <p:cNvSpPr>
+            <a:spLocks noGrp="1"/>
+          </p:cNvSpPr>
+          <p:nvPr>
+            <p:ph type="body" idx="1"/>
+          </p:nvPr>
+        </p:nvSpPr>
+        <p:spPr/>
+        <p:txBody>
+          <a:bodyPr/>
+          <a:lstStyle/>
+          <a:p>
+            <a:r>
+              <a:rPr lang="hu-HU" dirty="0"/>
+              <a:t>Az eszközök </a:t>
+            </a:r>
+            <a:r>
+              <a:rPr lang="hu-HU" dirty="0" err="1"/>
+              <a:t>ip</a:t>
+            </a:r>
+            <a:r>
+              <a:rPr lang="hu-HU" dirty="0"/>
+              <a:t> címét kinézni az ipcim.xlsx-</a:t>
+            </a:r>
+            <a:r>
+              <a:rPr lang="hu-HU" dirty="0" err="1"/>
+              <a:t>ből</a:t>
+            </a:r>
+            <a:br>
+              <a:rPr lang="hu-HU" dirty="0"/>
+            </a:br>
+            <a:r>
+              <a:rPr lang="hu-HU" dirty="0"/>
+              <a:t>és beállítani az adott eszközön</a:t>
+            </a:r>
+          </a:p>
+        </p:txBody>
+      </p:sp>
+      <p:pic>
+        <p:nvPicPr>
+          <p:cNvPr id="4" name="Kép 4" descr="A képen asztal látható&#10;&#10;Automatikusan generált leírás">
+            <a:extLst>
+              <a:ext uri="{FF2B5EF4-FFF2-40B4-BE49-F238E27FC236}">
+                <a16:creationId xmlns:a16="http://schemas.microsoft.com/office/drawing/2014/main" id="{439337FC-5059-87DA-7B85-8EACFE6F7BA1}"/>
+              </a:ext>
+            </a:extLst>
+          </p:cNvPr>
+          <p:cNvPicPr>
+            <a:picLocks noChangeAspect="1"/>
+          </p:cNvPicPr>
+          <p:nvPr/>
+        </p:nvPicPr>
+        <p:blipFill>
+          <a:blip r:embed="rId2"/>
+          <a:stretch>
+            <a:fillRect/>
+          </a:stretch>
+        </p:blipFill>
+        <p:spPr>
+          <a:xfrm>
+            <a:off x="8353269" y="2180165"/>
+            <a:ext cx="2743200" cy="3447047"/>
+          </a:xfrm>
+          <a:prstGeom prst="rect">
+            <a:avLst/>
+          </a:prstGeom>
+        </p:spPr>
+      </p:pic>
+      <p:pic>
+        <p:nvPicPr>
+          <p:cNvPr id="9" name="Kép 9">
+            <a:extLst>
+              <a:ext uri="{FF2B5EF4-FFF2-40B4-BE49-F238E27FC236}">
+                <a16:creationId xmlns:a16="http://schemas.microsoft.com/office/drawing/2014/main" id="{FB36ED72-7255-E189-CA25-CF7AFCB37702}"/>
+              </a:ext>
+            </a:extLst>
+          </p:cNvPr>
+          <p:cNvPicPr>
+            <a:picLocks noChangeAspect="1"/>
+          </p:cNvPicPr>
+          <p:nvPr/>
+        </p:nvPicPr>
+        <p:blipFill>
+          <a:blip r:embed="rId3"/>
+          <a:stretch>
+            <a:fillRect/>
+          </a:stretch>
+        </p:blipFill>
+        <p:spPr>
+          <a:xfrm>
+            <a:off x="1382842" y="3048622"/>
+            <a:ext cx="6209675" cy="1778839"/>
+          </a:xfrm>
+          <a:prstGeom prst="rect">
+            <a:avLst/>
+          </a:prstGeom>
+        </p:spPr>
+      </p:pic>
+    </p:spTree>
+    <p:extLst>
+      <p:ext uri="{BB962C8B-B14F-4D97-AF65-F5344CB8AC3E}">
+        <p14:creationId xmlns:p14="http://schemas.microsoft.com/office/powerpoint/2010/main" val="1244611583"/>
+      </p:ext>
+    </p:extLst>
+  </p:cSld>
+  <p:clrMapOvr>
+    <a:masterClrMapping/>
+  </p:clrMapOvr>
+</p:sld>
+</file>
+
+<file path=ppt/slides/slide34.xml><?xml version="1.0" encoding="utf-8"?>
+<p:sld xmlns:a="http://schemas.openxmlformats.org/drawingml/2006/main" xmlns:r="http://schemas.openxmlformats.org/officeDocument/2006/relationships" xmlns:p="http://schemas.openxmlformats.org/presentationml/2006/main">
+  <p:cSld>
+    <p:spTree>
+      <p:nvGrpSpPr>
+        <p:cNvPr id="1" name=""/>
+        <p:cNvGrpSpPr/>
+        <p:nvPr/>
+      </p:nvGrpSpPr>
+      <p:grpSpPr>
+        <a:xfrm>
+          <a:off x="0" y="0"/>
+          <a:ext cx="0" cy="0"/>
+          <a:chOff x="0" y="0"/>
+          <a:chExt cx="0" cy="0"/>
+        </a:xfrm>
+      </p:grpSpPr>
+      <p:sp>
+        <p:nvSpPr>
+          <p:cNvPr id="2" name="Cím 1">
+            <a:extLst>
+              <a:ext uri="{FF2B5EF4-FFF2-40B4-BE49-F238E27FC236}">
+                <a16:creationId xmlns:a16="http://schemas.microsoft.com/office/drawing/2014/main" id="{C4A341E0-B181-A567-647E-108D98892EA3}"/>
+              </a:ext>
+            </a:extLst>
+          </p:cNvPr>
+          <p:cNvSpPr>
+            <a:spLocks noGrp="1"/>
+          </p:cNvSpPr>
+          <p:nvPr>
+            <p:ph type="title"/>
+          </p:nvPr>
+        </p:nvSpPr>
+        <p:spPr/>
+        <p:txBody>
+          <a:bodyPr/>
+          <a:lstStyle/>
+          <a:p>
+            <a:r>
+              <a:rPr lang="hu-HU" dirty="0"/>
+              <a:t>A </a:t>
+            </a:r>
+            <a:r>
+              <a:rPr lang="hu-HU" dirty="0" err="1"/>
+              <a:t>switchen</a:t>
+            </a:r>
+          </a:p>
+        </p:txBody>
+      </p:sp>
+      <p:sp>
+        <p:nvSpPr>
+          <p:cNvPr id="3" name="Szöveg helye 2">
+            <a:extLst>
+              <a:ext uri="{FF2B5EF4-FFF2-40B4-BE49-F238E27FC236}">
+                <a16:creationId xmlns:a16="http://schemas.microsoft.com/office/drawing/2014/main" id="{93FF38D0-A065-AF5E-A84B-A71B43F3C2CF}"/>
+              </a:ext>
+            </a:extLst>
+          </p:cNvPr>
+          <p:cNvSpPr>
+            <a:spLocks noGrp="1"/>
+          </p:cNvSpPr>
+          <p:nvPr>
+            <p:ph type="body" idx="1"/>
+          </p:nvPr>
+        </p:nvSpPr>
+        <p:spPr/>
+        <p:txBody>
+          <a:bodyPr/>
+          <a:lstStyle/>
+          <a:p>
+            <a:r>
+              <a:rPr lang="hu-HU" dirty="0" err="1"/>
+              <a:t>Switchen</a:t>
+            </a:r>
+            <a:r>
+              <a:rPr lang="hu-HU" dirty="0"/>
+              <a:t> jelszó és telnet beállítása</a:t>
+            </a:r>
+          </a:p>
+        </p:txBody>
+      </p:sp>
+      <p:pic>
+        <p:nvPicPr>
+          <p:cNvPr id="4" name="Kép 4" descr="A képen szöveg látható&#10;&#10;Automatikusan generált leírás">
+            <a:extLst>
+              <a:ext uri="{FF2B5EF4-FFF2-40B4-BE49-F238E27FC236}">
+                <a16:creationId xmlns:a16="http://schemas.microsoft.com/office/drawing/2014/main" id="{083E9C44-8BC4-C8DE-D4F3-F0EBA994C2E7}"/>
+              </a:ext>
+            </a:extLst>
+          </p:cNvPr>
+          <p:cNvPicPr>
+            <a:picLocks noChangeAspect="1"/>
+          </p:cNvPicPr>
+          <p:nvPr/>
+        </p:nvPicPr>
+        <p:blipFill>
+          <a:blip r:embed="rId2"/>
+          <a:stretch>
+            <a:fillRect/>
+          </a:stretch>
+        </p:blipFill>
+        <p:spPr>
+          <a:xfrm>
+            <a:off x="1813810" y="2372811"/>
+            <a:ext cx="7471346" cy="3536442"/>
+          </a:xfrm>
+          <a:prstGeom prst="rect">
+            <a:avLst/>
+          </a:prstGeom>
+        </p:spPr>
+      </p:pic>
+    </p:spTree>
+    <p:extLst>
+      <p:ext uri="{BB962C8B-B14F-4D97-AF65-F5344CB8AC3E}">
+        <p14:creationId xmlns:p14="http://schemas.microsoft.com/office/powerpoint/2010/main" val="993668133"/>
+      </p:ext>
+    </p:extLst>
+  </p:cSld>
+  <p:clrMapOvr>
+    <a:masterClrMapping/>
+  </p:clrMapOvr>
+</p:sld>
+</file>
+
+<file path=ppt/slides/slide35.xml><?xml version="1.0" encoding="utf-8"?>
+<p:sld xmlns:a="http://schemas.openxmlformats.org/drawingml/2006/main" xmlns:r="http://schemas.openxmlformats.org/officeDocument/2006/relationships" xmlns:p="http://schemas.openxmlformats.org/presentationml/2006/main">
+  <p:cSld>
+    <p:spTree>
+      <p:nvGrpSpPr>
+        <p:cNvPr id="1" name=""/>
+        <p:cNvGrpSpPr/>
+        <p:nvPr/>
+      </p:nvGrpSpPr>
+      <p:grpSpPr>
+        <a:xfrm>
+          <a:off x="0" y="0"/>
+          <a:ext cx="0" cy="0"/>
+          <a:chOff x="0" y="0"/>
+          <a:chExt cx="0" cy="0"/>
+        </a:xfrm>
+      </p:grpSpPr>
+      <p:sp>
+        <p:nvSpPr>
+          <p:cNvPr id="2" name="Cím 1">
+            <a:extLst>
+              <a:ext uri="{FF2B5EF4-FFF2-40B4-BE49-F238E27FC236}">
+                <a16:creationId xmlns:a16="http://schemas.microsoft.com/office/drawing/2014/main" id="{C65A31D5-E8AB-AADC-BE65-EBDAA82EC33F}"/>
+              </a:ext>
+            </a:extLst>
+          </p:cNvPr>
+          <p:cNvSpPr>
+            <a:spLocks noGrp="1"/>
+          </p:cNvSpPr>
+          <p:nvPr>
+            <p:ph type="title"/>
+          </p:nvPr>
+        </p:nvSpPr>
+        <p:spPr/>
+        <p:txBody>
+          <a:bodyPr/>
+          <a:lstStyle/>
+          <a:p>
+            <a:r>
+              <a:rPr lang="hu-HU" dirty="0"/>
+              <a:t>A routeren</a:t>
+            </a:r>
+          </a:p>
+        </p:txBody>
+      </p:sp>
+      <p:sp>
+        <p:nvSpPr>
+          <p:cNvPr id="3" name="Szöveg helye 2">
+            <a:extLst>
+              <a:ext uri="{FF2B5EF4-FFF2-40B4-BE49-F238E27FC236}">
+                <a16:creationId xmlns:a16="http://schemas.microsoft.com/office/drawing/2014/main" id="{E9572B3A-EE35-BD7F-EBF4-ED80AF8857BB}"/>
+              </a:ext>
+            </a:extLst>
+          </p:cNvPr>
+          <p:cNvSpPr>
+            <a:spLocks noGrp="1"/>
+          </p:cNvSpPr>
+          <p:nvPr>
+            <p:ph type="body" idx="1"/>
+          </p:nvPr>
+        </p:nvSpPr>
+        <p:spPr/>
+        <p:txBody>
+          <a:bodyPr/>
+          <a:lstStyle/>
+          <a:p>
+            <a:r>
+              <a:rPr lang="hu-HU" dirty="0"/>
+              <a:t>A routeren </a:t>
+            </a:r>
+            <a:r>
+              <a:rPr lang="hu-HU" dirty="0" err="1"/>
+              <a:t>ip</a:t>
+            </a:r>
+            <a:r>
+              <a:rPr lang="hu-HU" dirty="0"/>
+              <a:t> cím, átjáró és bejelentkezési üzenet</a:t>
+            </a:r>
+          </a:p>
+        </p:txBody>
+      </p:sp>
+      <p:pic>
+        <p:nvPicPr>
+          <p:cNvPr id="4" name="Kép 4" descr="A képen szöveg, beltéri, képernyőkép látható&#10;&#10;Automatikusan generált leírás">
+            <a:extLst>
+              <a:ext uri="{FF2B5EF4-FFF2-40B4-BE49-F238E27FC236}">
+                <a16:creationId xmlns:a16="http://schemas.microsoft.com/office/drawing/2014/main" id="{819D582C-18AC-C57B-6B13-7740C745E676}"/>
+              </a:ext>
+            </a:extLst>
+          </p:cNvPr>
+          <p:cNvPicPr>
+            <a:picLocks noChangeAspect="1"/>
+          </p:cNvPicPr>
+          <p:nvPr/>
+        </p:nvPicPr>
+        <p:blipFill>
+          <a:blip r:embed="rId2"/>
+          <a:stretch>
+            <a:fillRect/>
+          </a:stretch>
+        </p:blipFill>
+        <p:spPr>
+          <a:xfrm>
+            <a:off x="2388433" y="2511496"/>
+            <a:ext cx="6240904" cy="3602597"/>
+          </a:xfrm>
+          <a:prstGeom prst="rect">
+            <a:avLst/>
+          </a:prstGeom>
+        </p:spPr>
+      </p:pic>
+    </p:spTree>
+    <p:extLst>
+      <p:ext uri="{BB962C8B-B14F-4D97-AF65-F5344CB8AC3E}">
+        <p14:creationId xmlns:p14="http://schemas.microsoft.com/office/powerpoint/2010/main" val="1275090007"/>
+      </p:ext>
+    </p:extLst>
+  </p:cSld>
+  <p:clrMapOvr>
+    <a:masterClrMapping/>
+  </p:clrMapOvr>
+</p:sld>
+</file>
+
+<file path=ppt/slides/slide36.xml><?xml version="1.0" encoding="utf-8"?>
+<p:sld xmlns:a="http://schemas.openxmlformats.org/drawingml/2006/main" xmlns:r="http://schemas.openxmlformats.org/officeDocument/2006/relationships" xmlns:p="http://schemas.openxmlformats.org/presentationml/2006/main">
+  <p:cSld>
+    <p:spTree>
+      <p:nvGrpSpPr>
+        <p:cNvPr id="1" name=""/>
+        <p:cNvGrpSpPr/>
+        <p:nvPr/>
+      </p:nvGrpSpPr>
+      <p:grpSpPr>
+        <a:xfrm>
+          <a:off x="0" y="0"/>
+          <a:ext cx="0" cy="0"/>
+          <a:chOff x="0" y="0"/>
+          <a:chExt cx="0" cy="0"/>
+        </a:xfrm>
+      </p:grpSpPr>
+      <p:sp>
+        <p:nvSpPr>
+          <p:cNvPr id="2" name="Cím 1">
+            <a:extLst>
+              <a:ext uri="{FF2B5EF4-FFF2-40B4-BE49-F238E27FC236}">
+                <a16:creationId xmlns:a16="http://schemas.microsoft.com/office/drawing/2014/main" id="{831BF208-ABE7-FC5F-34B1-8A4B37D7D345}"/>
+              </a:ext>
+            </a:extLst>
+          </p:cNvPr>
+          <p:cNvSpPr>
+            <a:spLocks noGrp="1"/>
+          </p:cNvSpPr>
+          <p:nvPr>
+            <p:ph type="title"/>
+          </p:nvPr>
+        </p:nvSpPr>
+        <p:spPr/>
+        <p:txBody>
+          <a:bodyPr/>
+          <a:lstStyle/>
+          <a:p>
+            <a:r>
+              <a:rPr lang="hu-HU" dirty="0"/>
+              <a:t>És utoljára a </a:t>
+            </a:r>
+            <a:r>
+              <a:rPr lang="hu-HU" dirty="0" err="1"/>
+              <a:t>tftp</a:t>
+            </a:r>
+            <a:r>
+              <a:rPr lang="hu-HU" dirty="0"/>
+              <a:t> szerverre mentés</a:t>
+            </a:r>
+          </a:p>
+        </p:txBody>
+      </p:sp>
+      <p:sp>
+        <p:nvSpPr>
+          <p:cNvPr id="3" name="Szöveg helye 2">
+            <a:extLst>
+              <a:ext uri="{FF2B5EF4-FFF2-40B4-BE49-F238E27FC236}">
+                <a16:creationId xmlns:a16="http://schemas.microsoft.com/office/drawing/2014/main" id="{B368E4F4-EC82-398A-3F6F-B652DECF5E8E}"/>
+              </a:ext>
+            </a:extLst>
+          </p:cNvPr>
+          <p:cNvSpPr>
+            <a:spLocks noGrp="1"/>
+          </p:cNvSpPr>
+          <p:nvPr>
+            <p:ph type="body" idx="1"/>
+          </p:nvPr>
+        </p:nvSpPr>
+        <p:spPr/>
+        <p:txBody>
+          <a:bodyPr/>
+          <a:lstStyle/>
+          <a:p>
+            <a:r>
+              <a:rPr lang="hu-HU" dirty="0"/>
+              <a:t>A </a:t>
+            </a:r>
+            <a:r>
+              <a:rPr lang="hu-HU" dirty="0" err="1"/>
+              <a:t>konfig</a:t>
+            </a:r>
+            <a:r>
+              <a:rPr lang="hu-HU" dirty="0"/>
+              <a:t> mentéséhez ez lett használva: </a:t>
+            </a:r>
+          </a:p>
+          <a:p>
+            <a:pPr marL="114300" indent="0">
+              <a:buNone/>
+            </a:pPr>
+            <a:r>
+              <a:rPr lang="hu-HU" dirty="0"/>
+              <a:t>    </a:t>
+            </a:r>
+            <a:r>
+              <a:rPr lang="hu-HU" dirty="0" err="1"/>
+              <a:t>copy</a:t>
+            </a:r>
+            <a:r>
+              <a:rPr lang="hu-HU" dirty="0"/>
+              <a:t> startup-</a:t>
+            </a:r>
+            <a:r>
+              <a:rPr lang="hu-HU" dirty="0" err="1"/>
+              <a:t>config</a:t>
+            </a:r>
+            <a:r>
+              <a:rPr lang="hu-HU" dirty="0"/>
+              <a:t> </a:t>
+            </a:r>
+            <a:r>
+              <a:rPr lang="hu-HU" dirty="0" err="1"/>
+              <a:t>tftp</a:t>
+            </a:r>
+            <a:r>
+              <a:rPr lang="hu-HU" dirty="0"/>
+              <a:t>:</a:t>
+            </a:r>
+          </a:p>
+        </p:txBody>
+      </p:sp>
+      <p:pic>
+        <p:nvPicPr>
+          <p:cNvPr id="4" name="Kép 4">
+            <a:extLst>
+              <a:ext uri="{FF2B5EF4-FFF2-40B4-BE49-F238E27FC236}">
+                <a16:creationId xmlns:a16="http://schemas.microsoft.com/office/drawing/2014/main" id="{78C7116D-299F-3981-E1BE-FB464C4F7426}"/>
+              </a:ext>
+            </a:extLst>
+          </p:cNvPr>
+          <p:cNvPicPr>
+            <a:picLocks noChangeAspect="1"/>
+          </p:cNvPicPr>
+          <p:nvPr/>
+        </p:nvPicPr>
+        <p:blipFill>
+          <a:blip r:embed="rId2"/>
+          <a:stretch>
+            <a:fillRect/>
+          </a:stretch>
+        </p:blipFill>
+        <p:spPr>
+          <a:xfrm>
+            <a:off x="2400925" y="2989881"/>
+            <a:ext cx="6646888" cy="2452205"/>
+          </a:xfrm>
+          <a:prstGeom prst="rect">
+            <a:avLst/>
+          </a:prstGeom>
+        </p:spPr>
+      </p:pic>
+    </p:spTree>
+    <p:extLst>
+      <p:ext uri="{BB962C8B-B14F-4D97-AF65-F5344CB8AC3E}">
+        <p14:creationId xmlns:p14="http://schemas.microsoft.com/office/powerpoint/2010/main" val="2278190912"/>
+      </p:ext>
+    </p:extLst>
+  </p:cSld>
+  <p:clrMapOvr>
+    <a:masterClrMapping/>
+  </p:clrMapOvr>
+</p:sld>
+</file>
+
+<file path=ppt/slides/slide37.xml><?xml version="1.0" encoding="utf-8"?>
 <p:sld xmlns:a="http://schemas.openxmlformats.org/drawingml/2006/main" xmlns:r="http://schemas.openxmlformats.org/officeDocument/2006/relationships" xmlns:p="http://schemas.openxmlformats.org/presentationml/2006/main">
   <p:cSld>
     <p:spTree>
@@ -18999,7 +19761,7 @@
 </p:sld>
 </file>
 
-<file path=ppt/slides/slide33.xml><?xml version="1.0" encoding="utf-8"?>
+<file path=ppt/slides/slide38.xml><?xml version="1.0" encoding="utf-8"?>
 <p:sld xmlns:a="http://schemas.openxmlformats.org/drawingml/2006/main" xmlns:r="http://schemas.openxmlformats.org/officeDocument/2006/relationships" xmlns:p="http://schemas.openxmlformats.org/presentationml/2006/main">
   <p:cSld>
     <p:spTree>
@@ -19089,7 +19851,7 @@
 </p:sld>
 </file>
 
-<file path=ppt/slides/slide34.xml><?xml version="1.0" encoding="utf-8"?>
+<file path=ppt/slides/slide39.xml><?xml version="1.0" encoding="utf-8"?>
 <p:sld xmlns:a="http://schemas.openxmlformats.org/drawingml/2006/main" xmlns:r="http://schemas.openxmlformats.org/officeDocument/2006/relationships" xmlns:p="http://schemas.openxmlformats.org/presentationml/2006/main">
   <p:cSld>
     <p:spTree>
@@ -19254,7 +20016,124 @@
 </p:sld>
 </file>
 
-<file path=ppt/slides/slide35.xml><?xml version="1.0" encoding="utf-8"?>
+<file path=ppt/slides/slide4.xml><?xml version="1.0" encoding="utf-8"?>
+<p:sld xmlns:a="http://schemas.openxmlformats.org/drawingml/2006/main" xmlns:r="http://schemas.openxmlformats.org/officeDocument/2006/relationships" xmlns:p="http://schemas.openxmlformats.org/presentationml/2006/main">
+  <p:cSld>
+    <p:spTree>
+      <p:nvGrpSpPr>
+        <p:cNvPr id="1" name="Shape 113"/>
+        <p:cNvGrpSpPr/>
+        <p:nvPr/>
+      </p:nvGrpSpPr>
+      <p:grpSpPr>
+        <a:xfrm>
+          <a:off x="0" y="0"/>
+          <a:ext cx="0" cy="0"/>
+          <a:chOff x="0" y="0"/>
+          <a:chExt cx="0" cy="0"/>
+        </a:xfrm>
+      </p:grpSpPr>
+      <p:sp>
+        <p:nvSpPr>
+          <p:cNvPr id="114" name="Google Shape;114;g18fd315c07e_0_5"/>
+          <p:cNvSpPr txBox="1">
+            <a:spLocks noGrp="1"/>
+          </p:cNvSpPr>
+          <p:nvPr>
+            <p:ph type="ctrTitle"/>
+          </p:nvPr>
+        </p:nvSpPr>
+        <p:spPr>
+          <a:xfrm>
+            <a:off x="1524000" y="1122363"/>
+            <a:ext cx="9144000" cy="2387700"/>
+          </a:xfrm>
+          <a:prstGeom prst="rect">
+            <a:avLst/>
+          </a:prstGeom>
+        </p:spPr>
+        <p:txBody>
+          <a:bodyPr spcFirstLastPara="1" wrap="square" lIns="91425" tIns="45700" rIns="91425" bIns="45700" anchor="b" anchorCtr="0">
+            <a:normAutofit/>
+          </a:bodyPr>
+          <a:lstStyle/>
+          <a:p>
+            <a:pPr marL="0" lvl="0" indent="0" algn="ctr" rtl="0">
+              <a:spcBef>
+                <a:spcPts val="0"/>
+              </a:spcBef>
+              <a:spcAft>
+                <a:spcPts val="0"/>
+              </a:spcAft>
+              <a:buNone/>
+            </a:pPr>
+            <a:r>
+              <a:rPr lang="hu-HU" sz="4900">
+                <a:highlight>
+                  <a:srgbClr val="FFFFFF"/>
+                </a:highlight>
+                <a:latin typeface="Arial"/>
+                <a:ea typeface="Arial"/>
+                <a:cs typeface="Arial"/>
+                <a:sym typeface="Arial"/>
+              </a:rPr>
+              <a:t>IP címek kiosztása (VLSM)</a:t>
+            </a:r>
+            <a:endParaRPr sz="9900"/>
+          </a:p>
+        </p:txBody>
+      </p:sp>
+      <p:sp>
+        <p:nvSpPr>
+          <p:cNvPr id="115" name="Google Shape;115;g18fd315c07e_0_5"/>
+          <p:cNvSpPr txBox="1">
+            <a:spLocks noGrp="1"/>
+          </p:cNvSpPr>
+          <p:nvPr>
+            <p:ph type="subTitle" idx="1"/>
+          </p:nvPr>
+        </p:nvSpPr>
+        <p:spPr>
+          <a:xfrm>
+            <a:off x="1524000" y="3602038"/>
+            <a:ext cx="9144000" cy="1655700"/>
+          </a:xfrm>
+          <a:prstGeom prst="rect">
+            <a:avLst/>
+          </a:prstGeom>
+        </p:spPr>
+        <p:txBody>
+          <a:bodyPr spcFirstLastPara="1" wrap="square" lIns="91425" tIns="45700" rIns="91425" bIns="45700" anchor="t" anchorCtr="0">
+            <a:normAutofit/>
+          </a:bodyPr>
+          <a:lstStyle/>
+          <a:p>
+            <a:pPr marL="0" lvl="0" indent="0" algn="ctr" rtl="0">
+              <a:spcBef>
+                <a:spcPts val="1000"/>
+              </a:spcBef>
+              <a:spcAft>
+                <a:spcPts val="0"/>
+              </a:spcAft>
+              <a:buNone/>
+            </a:pPr>
+            <a:r>
+              <a:rPr lang="hu-HU"/>
+              <a:t>Ocskó Gábor</a:t>
+            </a:r>
+            <a:endParaRPr/>
+          </a:p>
+        </p:txBody>
+      </p:sp>
+    </p:spTree>
+  </p:cSld>
+  <p:clrMapOvr>
+    <a:masterClrMapping/>
+  </p:clrMapOvr>
+</p:sld>
+</file>
+
+<file path=ppt/slides/slide40.xml><?xml version="1.0" encoding="utf-8"?>
 <p:sld xmlns:a="http://schemas.openxmlformats.org/drawingml/2006/main" xmlns:r="http://schemas.openxmlformats.org/officeDocument/2006/relationships" xmlns:p="http://schemas.openxmlformats.org/presentationml/2006/main">
   <p:cSld>
     <p:spTree>
@@ -19348,7 +20227,7 @@
 </p:sld>
 </file>
 
-<file path=ppt/slides/slide36.xml><?xml version="1.0" encoding="utf-8"?>
+<file path=ppt/slides/slide41.xml><?xml version="1.0" encoding="utf-8"?>
 <p:sld xmlns:a="http://schemas.openxmlformats.org/drawingml/2006/main" xmlns:r="http://schemas.openxmlformats.org/officeDocument/2006/relationships" xmlns:p="http://schemas.openxmlformats.org/presentationml/2006/main">
   <p:cSld>
     <p:spTree>
@@ -19472,7 +20351,7 @@
 </p:sld>
 </file>
 
-<file path=ppt/slides/slide37.xml><?xml version="1.0" encoding="utf-8"?>
+<file path=ppt/slides/slide42.xml><?xml version="1.0" encoding="utf-8"?>
 <p:sld xmlns:a="http://schemas.openxmlformats.org/drawingml/2006/main" xmlns:r="http://schemas.openxmlformats.org/officeDocument/2006/relationships" xmlns:p="http://schemas.openxmlformats.org/presentationml/2006/main">
   <p:cSld>
     <p:spTree>
@@ -19578,12 +20457,12 @@
 </p:sld>
 </file>
 
-<file path=ppt/slides/slide38.xml><?xml version="1.0" encoding="utf-8"?>
+<file path=ppt/slides/slide43.xml><?xml version="1.0" encoding="utf-8"?>
 <p:sld xmlns:a="http://schemas.openxmlformats.org/drawingml/2006/main" xmlns:r="http://schemas.openxmlformats.org/officeDocument/2006/relationships" xmlns:p="http://schemas.openxmlformats.org/presentationml/2006/main">
   <p:cSld>
     <p:spTree>
       <p:nvGrpSpPr>
-        <p:cNvPr id="1" name="Shape 258"/>
+        <p:cNvPr id="1" name=""/>
         <p:cNvGrpSpPr/>
         <p:nvPr/>
       </p:nvGrpSpPr>
@@ -19597,85 +20476,66 @@
       </p:grpSpPr>
       <p:sp>
         <p:nvSpPr>
-          <p:cNvPr id="259" name="Google Shape;259;g18fd315c07e_0_483"/>
-          <p:cNvSpPr txBox="1">
+          <p:cNvPr id="2" name="Cím 1">
+            <a:extLst>
+              <a:ext uri="{FF2B5EF4-FFF2-40B4-BE49-F238E27FC236}">
+                <a16:creationId xmlns:a16="http://schemas.microsoft.com/office/drawing/2014/main" id="{9699E73F-9297-F00E-0C7F-B9AAB1AEF341}"/>
+              </a:ext>
+            </a:extLst>
+          </p:cNvPr>
+          <p:cNvSpPr>
             <a:spLocks noGrp="1"/>
           </p:cNvSpPr>
           <p:nvPr>
             <p:ph type="ctrTitle"/>
           </p:nvPr>
         </p:nvSpPr>
-        <p:spPr>
-          <a:xfrm>
-            <a:off x="1524000" y="1122363"/>
-            <a:ext cx="9144000" cy="2387700"/>
-          </a:xfrm>
-          <a:prstGeom prst="rect">
-            <a:avLst/>
-          </a:prstGeom>
-        </p:spPr>
+        <p:spPr/>
         <p:txBody>
-          <a:bodyPr spcFirstLastPara="1" wrap="square" lIns="91425" tIns="45700" rIns="91425" bIns="45700" anchor="b" anchorCtr="0">
-            <a:normAutofit/>
-          </a:bodyPr>
+          <a:bodyPr/>
           <a:lstStyle/>
           <a:p>
-            <a:pPr marL="0" lvl="0" indent="0" algn="ctr" rtl="0">
-              <a:spcBef>
-                <a:spcPts val="0"/>
-              </a:spcBef>
-              <a:spcAft>
-                <a:spcPts val="0"/>
-              </a:spcAft>
-              <a:buNone/>
-            </a:pPr>
-            <a:r>
-              <a:rPr lang="hu-HU"/>
-              <a:t>Köszönjük a figyelmet!</a:t>
-            </a:r>
-            <a:endParaRPr/>
+            <a:r>
+              <a:rPr lang="hu-HU" dirty="0"/>
+              <a:t>I, K, S és O hálózat</a:t>
+            </a:r>
           </a:p>
         </p:txBody>
       </p:sp>
       <p:sp>
         <p:nvSpPr>
-          <p:cNvPr id="260" name="Google Shape;260;g18fd315c07e_0_483"/>
-          <p:cNvSpPr txBox="1">
+          <p:cNvPr id="3" name="Alcím 2">
+            <a:extLst>
+              <a:ext uri="{FF2B5EF4-FFF2-40B4-BE49-F238E27FC236}">
+                <a16:creationId xmlns:a16="http://schemas.microsoft.com/office/drawing/2014/main" id="{39FDDCC5-0696-C5DF-552F-F141F93847FB}"/>
+              </a:ext>
+            </a:extLst>
+          </p:cNvPr>
+          <p:cNvSpPr>
             <a:spLocks noGrp="1"/>
           </p:cNvSpPr>
           <p:nvPr>
             <p:ph type="subTitle" idx="1"/>
           </p:nvPr>
         </p:nvSpPr>
-        <p:spPr>
-          <a:xfrm>
-            <a:off x="1524000" y="3602038"/>
-            <a:ext cx="9144000" cy="1655700"/>
-          </a:xfrm>
-          <a:prstGeom prst="rect">
-            <a:avLst/>
-          </a:prstGeom>
-        </p:spPr>
+        <p:spPr/>
         <p:txBody>
-          <a:bodyPr spcFirstLastPara="1" wrap="square" lIns="91425" tIns="45700" rIns="91425" bIns="45700" anchor="t" anchorCtr="0">
-            <a:normAutofit/>
-          </a:bodyPr>
+          <a:bodyPr/>
           <a:lstStyle/>
           <a:p>
-            <a:pPr marL="0" lvl="0" indent="0" algn="ctr" rtl="0">
-              <a:spcBef>
-                <a:spcPts val="1000"/>
-              </a:spcBef>
-              <a:spcAft>
-                <a:spcPts val="0"/>
-              </a:spcAft>
-              <a:buNone/>
-            </a:pPr>
-            <a:endParaRPr/>
+            <a:r>
+              <a:rPr lang="hu-HU" dirty="0"/>
+              <a:t>hm</a:t>
+            </a:r>
           </a:p>
         </p:txBody>
       </p:sp>
     </p:spTree>
+    <p:extLst>
+      <p:ext uri="{BB962C8B-B14F-4D97-AF65-F5344CB8AC3E}">
+        <p14:creationId xmlns:p14="http://schemas.microsoft.com/office/powerpoint/2010/main" val="3021077535"/>
+      </p:ext>
+    </p:extLst>
   </p:cSld>
   <p:clrMapOvr>
     <a:masterClrMapping/>
@@ -19683,12 +20543,12 @@
 </p:sld>
 </file>
 
-<file path=ppt/slides/slide4.xml><?xml version="1.0" encoding="utf-8"?>
+<file path=ppt/slides/slide44.xml><?xml version="1.0" encoding="utf-8"?>
 <p:sld xmlns:a="http://schemas.openxmlformats.org/drawingml/2006/main" xmlns:r="http://schemas.openxmlformats.org/officeDocument/2006/relationships" xmlns:p="http://schemas.openxmlformats.org/presentationml/2006/main">
   <p:cSld>
     <p:spTree>
       <p:nvGrpSpPr>
-        <p:cNvPr id="1" name="Shape 113"/>
+        <p:cNvPr id="1" name=""/>
         <p:cNvGrpSpPr/>
         <p:nvPr/>
       </p:nvGrpSpPr>
@@ -19702,97 +20562,626 @@
       </p:grpSpPr>
       <p:sp>
         <p:nvSpPr>
-          <p:cNvPr id="114" name="Google Shape;114;g18fd315c07e_0_5"/>
-          <p:cNvSpPr txBox="1">
+          <p:cNvPr id="2" name="Cím 1">
+            <a:extLst>
+              <a:ext uri="{FF2B5EF4-FFF2-40B4-BE49-F238E27FC236}">
+                <a16:creationId xmlns:a16="http://schemas.microsoft.com/office/drawing/2014/main" id="{61B2D6A4-D791-6B85-47E1-E989E1766B23}"/>
+              </a:ext>
+            </a:extLst>
+          </p:cNvPr>
+          <p:cNvSpPr>
+            <a:spLocks noGrp="1"/>
+          </p:cNvSpPr>
+          <p:nvPr>
+            <p:ph type="title"/>
+          </p:nvPr>
+        </p:nvSpPr>
+        <p:spPr/>
+        <p:txBody>
+          <a:bodyPr/>
+          <a:lstStyle/>
+          <a:p>
+            <a:r>
+              <a:rPr lang="hu-HU" dirty="0"/>
+              <a:t>A topológia</a:t>
+            </a:r>
+          </a:p>
+        </p:txBody>
+      </p:sp>
+      <p:pic>
+        <p:nvPicPr>
+          <p:cNvPr id="5" name="Kép 5">
+            <a:extLst>
+              <a:ext uri="{FF2B5EF4-FFF2-40B4-BE49-F238E27FC236}">
+                <a16:creationId xmlns:a16="http://schemas.microsoft.com/office/drawing/2014/main" id="{7D0C275D-C8CA-69E8-EC54-CD7EC16BB05B}"/>
+              </a:ext>
+            </a:extLst>
+          </p:cNvPr>
+          <p:cNvPicPr>
+            <a:picLocks noChangeAspect="1"/>
+          </p:cNvPicPr>
+          <p:nvPr/>
+        </p:nvPicPr>
+        <p:blipFill>
+          <a:blip r:embed="rId2"/>
+          <a:stretch>
+            <a:fillRect/>
+          </a:stretch>
+        </p:blipFill>
+        <p:spPr>
+          <a:xfrm>
+            <a:off x="539647" y="1715700"/>
+            <a:ext cx="10669247" cy="4269798"/>
+          </a:xfrm>
+          <a:prstGeom prst="rect">
+            <a:avLst/>
+          </a:prstGeom>
+        </p:spPr>
+      </p:pic>
+    </p:spTree>
+    <p:extLst>
+      <p:ext uri="{BB962C8B-B14F-4D97-AF65-F5344CB8AC3E}">
+        <p14:creationId xmlns:p14="http://schemas.microsoft.com/office/powerpoint/2010/main" val="2552110296"/>
+      </p:ext>
+    </p:extLst>
+  </p:cSld>
+  <p:clrMapOvr>
+    <a:masterClrMapping/>
+  </p:clrMapOvr>
+</p:sld>
+</file>
+
+<file path=ppt/slides/slide45.xml><?xml version="1.0" encoding="utf-8"?>
+<p:sld xmlns:a="http://schemas.openxmlformats.org/drawingml/2006/main" xmlns:r="http://schemas.openxmlformats.org/officeDocument/2006/relationships" xmlns:p="http://schemas.openxmlformats.org/presentationml/2006/main">
+  <p:cSld>
+    <p:spTree>
+      <p:nvGrpSpPr>
+        <p:cNvPr id="1" name=""/>
+        <p:cNvGrpSpPr/>
+        <p:nvPr/>
+      </p:nvGrpSpPr>
+      <p:grpSpPr>
+        <a:xfrm>
+          <a:off x="0" y="0"/>
+          <a:ext cx="0" cy="0"/>
+          <a:chOff x="0" y="0"/>
+          <a:chExt cx="0" cy="0"/>
+        </a:xfrm>
+      </p:grpSpPr>
+      <p:sp>
+        <p:nvSpPr>
+          <p:cNvPr id="2" name="Cím 1">
+            <a:extLst>
+              <a:ext uri="{FF2B5EF4-FFF2-40B4-BE49-F238E27FC236}">
+                <a16:creationId xmlns:a16="http://schemas.microsoft.com/office/drawing/2014/main" id="{542F226D-0370-2775-0111-D7594AA04033}"/>
+              </a:ext>
+            </a:extLst>
+          </p:cNvPr>
+          <p:cNvSpPr>
+            <a:spLocks noGrp="1"/>
+          </p:cNvSpPr>
+          <p:nvPr>
+            <p:ph type="title"/>
+          </p:nvPr>
+        </p:nvSpPr>
+        <p:spPr/>
+        <p:txBody>
+          <a:bodyPr/>
+          <a:lstStyle/>
+          <a:p>
+            <a:r>
+              <a:rPr lang="hu-HU" dirty="0"/>
+              <a:t>Na vajon gyerekek mi volt a feladat?</a:t>
+            </a:r>
+          </a:p>
+        </p:txBody>
+      </p:sp>
+      <p:sp>
+        <p:nvSpPr>
+          <p:cNvPr id="3" name="Szöveg helye 2">
+            <a:extLst>
+              <a:ext uri="{FF2B5EF4-FFF2-40B4-BE49-F238E27FC236}">
+                <a16:creationId xmlns:a16="http://schemas.microsoft.com/office/drawing/2014/main" id="{AD410181-D937-8974-E3E6-349BF0C01EBE}"/>
+              </a:ext>
+            </a:extLst>
+          </p:cNvPr>
+          <p:cNvSpPr>
+            <a:spLocks noGrp="1"/>
+          </p:cNvSpPr>
+          <p:nvPr>
+            <p:ph type="body" idx="1"/>
+          </p:nvPr>
+        </p:nvSpPr>
+        <p:spPr/>
+        <p:txBody>
+          <a:bodyPr/>
+          <a:lstStyle/>
+          <a:p>
+            <a:r>
+              <a:rPr lang="hu-HU" dirty="0"/>
+              <a:t>Az R-SZOLNOK </a:t>
+            </a:r>
+            <a:r>
+              <a:rPr lang="hu-HU" dirty="0" err="1"/>
+              <a:t>ip</a:t>
+            </a:r>
+            <a:r>
+              <a:rPr lang="hu-HU" dirty="0"/>
+              <a:t> címeit beállítani</a:t>
+            </a:r>
+          </a:p>
+          <a:p>
+            <a:r>
+              <a:rPr lang="hu-HU" dirty="0"/>
+              <a:t> jelszót állítani és nap üzenetet állítani</a:t>
+            </a:r>
+          </a:p>
+          <a:p>
+            <a:r>
+              <a:rPr lang="hu-HU" dirty="0" err="1"/>
+              <a:t>Konfigot</a:t>
+            </a:r>
+            <a:r>
+              <a:rPr lang="hu-HU" dirty="0"/>
+              <a:t> </a:t>
+            </a:r>
+            <a:r>
+              <a:rPr lang="hu-HU" dirty="0" err="1"/>
+              <a:t>tftp</a:t>
+            </a:r>
+            <a:r>
+              <a:rPr lang="hu-HU" dirty="0"/>
+              <a:t> szerverre menteni</a:t>
+            </a:r>
+          </a:p>
+        </p:txBody>
+      </p:sp>
+    </p:spTree>
+    <p:extLst>
+      <p:ext uri="{BB962C8B-B14F-4D97-AF65-F5344CB8AC3E}">
+        <p14:creationId xmlns:p14="http://schemas.microsoft.com/office/powerpoint/2010/main" val="2476143534"/>
+      </p:ext>
+    </p:extLst>
+  </p:cSld>
+  <p:clrMapOvr>
+    <a:masterClrMapping/>
+  </p:clrMapOvr>
+</p:sld>
+</file>
+
+<file path=ppt/slides/slide46.xml><?xml version="1.0" encoding="utf-8"?>
+<p:sld xmlns:a="http://schemas.openxmlformats.org/drawingml/2006/main" xmlns:r="http://schemas.openxmlformats.org/officeDocument/2006/relationships" xmlns:p="http://schemas.openxmlformats.org/presentationml/2006/main">
+  <p:cSld>
+    <p:spTree>
+      <p:nvGrpSpPr>
+        <p:cNvPr id="1" name=""/>
+        <p:cNvGrpSpPr/>
+        <p:nvPr/>
+      </p:nvGrpSpPr>
+      <p:grpSpPr>
+        <a:xfrm>
+          <a:off x="0" y="0"/>
+          <a:ext cx="0" cy="0"/>
+          <a:chOff x="0" y="0"/>
+          <a:chExt cx="0" cy="0"/>
+        </a:xfrm>
+      </p:grpSpPr>
+      <p:sp>
+        <p:nvSpPr>
+          <p:cNvPr id="2" name="Cím 1">
+            <a:extLst>
+              <a:ext uri="{FF2B5EF4-FFF2-40B4-BE49-F238E27FC236}">
+                <a16:creationId xmlns:a16="http://schemas.microsoft.com/office/drawing/2014/main" id="{7F0ADB40-881B-287C-1DFE-1287411D1582}"/>
+              </a:ext>
+            </a:extLst>
+          </p:cNvPr>
+          <p:cNvSpPr>
+            <a:spLocks noGrp="1"/>
+          </p:cNvSpPr>
+          <p:nvPr>
+            <p:ph type="title"/>
+          </p:nvPr>
+        </p:nvSpPr>
+        <p:spPr/>
+        <p:txBody>
+          <a:bodyPr/>
+          <a:lstStyle/>
+          <a:p>
+            <a:r>
+              <a:rPr lang="hu-HU" dirty="0"/>
+              <a:t>R-SZOLNOK</a:t>
+            </a:r>
+          </a:p>
+        </p:txBody>
+      </p:sp>
+      <p:sp>
+        <p:nvSpPr>
+          <p:cNvPr id="3" name="Szöveg helye 2">
+            <a:extLst>
+              <a:ext uri="{FF2B5EF4-FFF2-40B4-BE49-F238E27FC236}">
+                <a16:creationId xmlns:a16="http://schemas.microsoft.com/office/drawing/2014/main" id="{2921ECB3-71B1-B3D0-86BB-04FAD2E8E480}"/>
+              </a:ext>
+            </a:extLst>
+          </p:cNvPr>
+          <p:cNvSpPr>
+            <a:spLocks noGrp="1"/>
+          </p:cNvSpPr>
+          <p:nvPr>
+            <p:ph type="body" idx="1"/>
+          </p:nvPr>
+        </p:nvSpPr>
+        <p:spPr/>
+        <p:txBody>
+          <a:bodyPr/>
+          <a:lstStyle/>
+          <a:p>
+            <a:r>
+              <a:rPr lang="hu-HU" dirty="0"/>
+              <a:t>Az </a:t>
+            </a:r>
+            <a:r>
+              <a:rPr lang="hu-HU" dirty="0" err="1"/>
+              <a:t>ip</a:t>
+            </a:r>
+            <a:r>
+              <a:rPr lang="hu-HU" dirty="0"/>
+              <a:t> cím beállításhoz és a többi felsorolt cuccokhoz ezek kellettek:</a:t>
+            </a:r>
+          </a:p>
+        </p:txBody>
+      </p:sp>
+      <p:pic>
+        <p:nvPicPr>
+          <p:cNvPr id="6" name="Kép 6" descr="A képen szöveg látható&#10;&#10;Automatikusan generált leírás">
+            <a:extLst>
+              <a:ext uri="{FF2B5EF4-FFF2-40B4-BE49-F238E27FC236}">
+                <a16:creationId xmlns:a16="http://schemas.microsoft.com/office/drawing/2014/main" id="{C7B4FAE1-8250-7177-A537-6C278C7A1E57}"/>
+              </a:ext>
+            </a:extLst>
+          </p:cNvPr>
+          <p:cNvPicPr>
+            <a:picLocks noChangeAspect="1"/>
+          </p:cNvPicPr>
+          <p:nvPr/>
+        </p:nvPicPr>
+        <p:blipFill>
+          <a:blip r:embed="rId2"/>
+          <a:stretch>
+            <a:fillRect/>
+          </a:stretch>
+        </p:blipFill>
+        <p:spPr>
+          <a:xfrm>
+            <a:off x="3741842" y="2570813"/>
+            <a:ext cx="4770775" cy="3615127"/>
+          </a:xfrm>
+          <a:prstGeom prst="rect">
+            <a:avLst/>
+          </a:prstGeom>
+        </p:spPr>
+      </p:pic>
+    </p:spTree>
+    <p:extLst>
+      <p:ext uri="{BB962C8B-B14F-4D97-AF65-F5344CB8AC3E}">
+        <p14:creationId xmlns:p14="http://schemas.microsoft.com/office/powerpoint/2010/main" val="2172357873"/>
+      </p:ext>
+    </p:extLst>
+  </p:cSld>
+  <p:clrMapOvr>
+    <a:masterClrMapping/>
+  </p:clrMapOvr>
+</p:sld>
+</file>
+
+<file path=ppt/slides/slide47.xml><?xml version="1.0" encoding="utf-8"?>
+<p:sld xmlns:a="http://schemas.openxmlformats.org/drawingml/2006/main" xmlns:r="http://schemas.openxmlformats.org/officeDocument/2006/relationships" xmlns:p="http://schemas.openxmlformats.org/presentationml/2006/main">
+  <p:cSld>
+    <p:spTree>
+      <p:nvGrpSpPr>
+        <p:cNvPr id="1" name=""/>
+        <p:cNvGrpSpPr/>
+        <p:nvPr/>
+      </p:nvGrpSpPr>
+      <p:grpSpPr>
+        <a:xfrm>
+          <a:off x="0" y="0"/>
+          <a:ext cx="0" cy="0"/>
+          <a:chOff x="0" y="0"/>
+          <a:chExt cx="0" cy="0"/>
+        </a:xfrm>
+      </p:grpSpPr>
+      <p:sp>
+        <p:nvSpPr>
+          <p:cNvPr id="2" name="Cím 1">
+            <a:extLst>
+              <a:ext uri="{FF2B5EF4-FFF2-40B4-BE49-F238E27FC236}">
+                <a16:creationId xmlns:a16="http://schemas.microsoft.com/office/drawing/2014/main" id="{2FC3FF02-87F7-7030-CD5F-ED4A1F60A97A}"/>
+              </a:ext>
+            </a:extLst>
+          </p:cNvPr>
+          <p:cNvSpPr>
             <a:spLocks noGrp="1"/>
           </p:cNvSpPr>
           <p:nvPr>
             <p:ph type="ctrTitle"/>
           </p:nvPr>
         </p:nvSpPr>
-        <p:spPr>
-          <a:xfrm>
-            <a:off x="1524000" y="1122363"/>
-            <a:ext cx="9144000" cy="2387700"/>
-          </a:xfrm>
-          <a:prstGeom prst="rect">
-            <a:avLst/>
-          </a:prstGeom>
-        </p:spPr>
+        <p:spPr/>
         <p:txBody>
-          <a:bodyPr spcFirstLastPara="1" wrap="square" lIns="91425" tIns="45700" rIns="91425" bIns="45700" anchor="b" anchorCtr="0">
-            <a:normAutofit/>
-          </a:bodyPr>
+          <a:bodyPr/>
           <a:lstStyle/>
           <a:p>
-            <a:pPr marL="0" lvl="0" indent="0" algn="ctr" rtl="0">
-              <a:spcBef>
-                <a:spcPts val="0"/>
-              </a:spcBef>
-              <a:spcAft>
-                <a:spcPts val="0"/>
-              </a:spcAft>
-              <a:buNone/>
-            </a:pPr>
-            <a:r>
-              <a:rPr lang="hu-HU" sz="4900">
-                <a:highlight>
-                  <a:srgbClr val="FFFFFF"/>
-                </a:highlight>
-                <a:latin typeface="Arial"/>
-                <a:ea typeface="Arial"/>
-                <a:cs typeface="Arial"/>
-                <a:sym typeface="Arial"/>
-              </a:rPr>
-              <a:t>IP címek kiosztása (VLSM)</a:t>
-            </a:r>
-            <a:endParaRPr sz="9900"/>
+            <a:r>
+              <a:rPr lang="hu-HU" dirty="0"/>
+              <a:t>A hálózat ellenőrzése</a:t>
+            </a:r>
           </a:p>
         </p:txBody>
       </p:sp>
       <p:sp>
         <p:nvSpPr>
-          <p:cNvPr id="115" name="Google Shape;115;g18fd315c07e_0_5"/>
-          <p:cNvSpPr txBox="1">
+          <p:cNvPr id="3" name="Alcím 2">
+            <a:extLst>
+              <a:ext uri="{FF2B5EF4-FFF2-40B4-BE49-F238E27FC236}">
+                <a16:creationId xmlns:a16="http://schemas.microsoft.com/office/drawing/2014/main" id="{24B97D3B-985B-7889-A672-7D6F09D801BB}"/>
+              </a:ext>
+            </a:extLst>
+          </p:cNvPr>
+          <p:cNvSpPr>
             <a:spLocks noGrp="1"/>
           </p:cNvSpPr>
           <p:nvPr>
             <p:ph type="subTitle" idx="1"/>
           </p:nvPr>
         </p:nvSpPr>
+        <p:spPr/>
+        <p:txBody>
+          <a:bodyPr/>
+          <a:lstStyle/>
+          <a:p>
+            <a:r>
+              <a:rPr lang="hu-HU" dirty="0"/>
+              <a:t>P A I N</a:t>
+            </a:r>
+          </a:p>
+        </p:txBody>
+      </p:sp>
+    </p:spTree>
+    <p:extLst>
+      <p:ext uri="{BB962C8B-B14F-4D97-AF65-F5344CB8AC3E}">
+        <p14:creationId xmlns:p14="http://schemas.microsoft.com/office/powerpoint/2010/main" val="1153805312"/>
+      </p:ext>
+    </p:extLst>
+  </p:cSld>
+  <p:clrMapOvr>
+    <a:masterClrMapping/>
+  </p:clrMapOvr>
+</p:sld>
+</file>
+
+<file path=ppt/slides/slide48.xml><?xml version="1.0" encoding="utf-8"?>
+<p:sld xmlns:a="http://schemas.openxmlformats.org/drawingml/2006/main" xmlns:r="http://schemas.openxmlformats.org/officeDocument/2006/relationships" xmlns:p="http://schemas.openxmlformats.org/presentationml/2006/main">
+  <p:cSld>
+    <p:spTree>
+      <p:nvGrpSpPr>
+        <p:cNvPr id="1" name=""/>
+        <p:cNvGrpSpPr/>
+        <p:nvPr/>
+      </p:nvGrpSpPr>
+      <p:grpSpPr>
+        <a:xfrm>
+          <a:off x="0" y="0"/>
+          <a:ext cx="0" cy="0"/>
+          <a:chOff x="0" y="0"/>
+          <a:chExt cx="0" cy="0"/>
+        </a:xfrm>
+      </p:grpSpPr>
+      <p:sp>
+        <p:nvSpPr>
+          <p:cNvPr id="2" name="Cím 1">
+            <a:extLst>
+              <a:ext uri="{FF2B5EF4-FFF2-40B4-BE49-F238E27FC236}">
+                <a16:creationId xmlns:a16="http://schemas.microsoft.com/office/drawing/2014/main" id="{730645E9-BAF9-ED45-3BAB-544AA9CC156B}"/>
+              </a:ext>
+            </a:extLst>
+          </p:cNvPr>
+          <p:cNvSpPr>
+            <a:spLocks noGrp="1"/>
+          </p:cNvSpPr>
+          <p:nvPr>
+            <p:ph type="title"/>
+          </p:nvPr>
+        </p:nvSpPr>
+        <p:spPr/>
+        <p:txBody>
+          <a:bodyPr/>
+          <a:lstStyle/>
+          <a:p>
+            <a:r>
+              <a:rPr lang="hu-HU" dirty="0"/>
+              <a:t>Mi volt a feladat?</a:t>
+            </a:r>
+          </a:p>
+        </p:txBody>
+      </p:sp>
+      <p:sp>
+        <p:nvSpPr>
+          <p:cNvPr id="3" name="Szöveg helye 2">
+            <a:extLst>
+              <a:ext uri="{FF2B5EF4-FFF2-40B4-BE49-F238E27FC236}">
+                <a16:creationId xmlns:a16="http://schemas.microsoft.com/office/drawing/2014/main" id="{8CAC659F-B3D3-7F1E-8678-74DF70838E63}"/>
+              </a:ext>
+            </a:extLst>
+          </p:cNvPr>
+          <p:cNvSpPr>
+            <a:spLocks noGrp="1"/>
+          </p:cNvSpPr>
+          <p:nvPr>
+            <p:ph type="body" idx="1"/>
+          </p:nvPr>
+        </p:nvSpPr>
+        <p:spPr/>
+        <p:txBody>
+          <a:bodyPr/>
+          <a:lstStyle/>
+          <a:p>
+            <a:r>
+              <a:rPr lang="hu-HU" dirty="0"/>
+              <a:t>Csomagküldővel ellenőrizni</a:t>
+            </a:r>
+          </a:p>
+          <a:p>
+            <a:r>
+              <a:rPr lang="hu-HU" dirty="0" err="1"/>
+              <a:t>Pingelni</a:t>
+            </a:r>
+          </a:p>
+          <a:p>
+            <a:r>
+              <a:rPr lang="hu-HU" dirty="0"/>
+              <a:t>Gdprojekt.net oldal elérhető-e</a:t>
+            </a:r>
+          </a:p>
+          <a:p>
+            <a:r>
+              <a:rPr lang="hu-HU" dirty="0" err="1"/>
+              <a:t>Ssh</a:t>
+            </a:r>
+            <a:r>
+              <a:rPr lang="hu-HU" dirty="0"/>
+              <a:t> és telnet</a:t>
+            </a:r>
+          </a:p>
+        </p:txBody>
+      </p:sp>
+    </p:spTree>
+    <p:extLst>
+      <p:ext uri="{BB962C8B-B14F-4D97-AF65-F5344CB8AC3E}">
+        <p14:creationId xmlns:p14="http://schemas.microsoft.com/office/powerpoint/2010/main" val="3707460699"/>
+      </p:ext>
+    </p:extLst>
+  </p:cSld>
+  <p:clrMapOvr>
+    <a:masterClrMapping/>
+  </p:clrMapOvr>
+</p:sld>
+</file>
+
+<file path=ppt/slides/slide49.xml><?xml version="1.0" encoding="utf-8"?>
+<p:sld xmlns:a="http://schemas.openxmlformats.org/drawingml/2006/main" xmlns:r="http://schemas.openxmlformats.org/officeDocument/2006/relationships" xmlns:p="http://schemas.openxmlformats.org/presentationml/2006/main">
+  <p:cSld>
+    <p:spTree>
+      <p:nvGrpSpPr>
+        <p:cNvPr id="1" name=""/>
+        <p:cNvGrpSpPr/>
+        <p:nvPr/>
+      </p:nvGrpSpPr>
+      <p:grpSpPr>
+        <a:xfrm>
+          <a:off x="0" y="0"/>
+          <a:ext cx="0" cy="0"/>
+          <a:chOff x="0" y="0"/>
+          <a:chExt cx="0" cy="0"/>
+        </a:xfrm>
+      </p:grpSpPr>
+      <p:sp>
+        <p:nvSpPr>
+          <p:cNvPr id="2" name="Cím 1">
+            <a:extLst>
+              <a:ext uri="{FF2B5EF4-FFF2-40B4-BE49-F238E27FC236}">
+                <a16:creationId xmlns:a16="http://schemas.microsoft.com/office/drawing/2014/main" id="{25A9AEB3-8E21-18D4-27F5-BD6CC26E8A76}"/>
+              </a:ext>
+            </a:extLst>
+          </p:cNvPr>
+          <p:cNvSpPr>
+            <a:spLocks noGrp="1"/>
+          </p:cNvSpPr>
+          <p:nvPr>
+            <p:ph type="title"/>
+          </p:nvPr>
+        </p:nvSpPr>
+        <p:spPr/>
+        <p:txBody>
+          <a:bodyPr/>
+          <a:lstStyle/>
+          <a:p>
+            <a:r>
+              <a:rPr lang="hu-HU" dirty="0"/>
+              <a:t>Csomagküldő és </a:t>
+            </a:r>
+            <a:r>
+              <a:rPr lang="hu-HU" dirty="0" err="1"/>
+              <a:t>ping</a:t>
+            </a:r>
+          </a:p>
+        </p:txBody>
+      </p:sp>
+      <p:pic>
+        <p:nvPicPr>
+          <p:cNvPr id="4" name="Kép 4">
+            <a:extLst>
+              <a:ext uri="{FF2B5EF4-FFF2-40B4-BE49-F238E27FC236}">
+                <a16:creationId xmlns:a16="http://schemas.microsoft.com/office/drawing/2014/main" id="{245F9492-77AC-8684-BF0E-0E265C507C62}"/>
+              </a:ext>
+            </a:extLst>
+          </p:cNvPr>
+          <p:cNvPicPr>
+            <a:picLocks noChangeAspect="1"/>
+          </p:cNvPicPr>
+          <p:nvPr/>
+        </p:nvPicPr>
+        <p:blipFill>
+          <a:blip r:embed="rId2"/>
+          <a:stretch>
+            <a:fillRect/>
+          </a:stretch>
+        </p:blipFill>
         <p:spPr>
           <a:xfrm>
-            <a:off x="1524000" y="3602038"/>
-            <a:ext cx="9144000" cy="1655700"/>
+            <a:off x="801974" y="1583870"/>
+            <a:ext cx="10625527" cy="923325"/>
           </a:xfrm>
           <a:prstGeom prst="rect">
             <a:avLst/>
           </a:prstGeom>
         </p:spPr>
-        <p:txBody>
-          <a:bodyPr spcFirstLastPara="1" wrap="square" lIns="91425" tIns="45700" rIns="91425" bIns="45700" anchor="t" anchorCtr="0">
-            <a:normAutofit/>
-          </a:bodyPr>
-          <a:lstStyle/>
-          <a:p>
-            <a:pPr marL="0" lvl="0" indent="0" algn="ctr" rtl="0">
-              <a:spcBef>
-                <a:spcPts val="1000"/>
-              </a:spcBef>
-              <a:spcAft>
-                <a:spcPts val="0"/>
-              </a:spcAft>
-              <a:buNone/>
-            </a:pPr>
-            <a:r>
-              <a:rPr lang="hu-HU"/>
-              <a:t>Ocskó Gábor</a:t>
-            </a:r>
-            <a:endParaRPr/>
-          </a:p>
-        </p:txBody>
-      </p:sp>
+      </p:pic>
+      <p:pic>
+        <p:nvPicPr>
+          <p:cNvPr id="5" name="Kép 5" descr="A képen szöveg látható&#10;&#10;Automatikusan generált leírás">
+            <a:extLst>
+              <a:ext uri="{FF2B5EF4-FFF2-40B4-BE49-F238E27FC236}">
+                <a16:creationId xmlns:a16="http://schemas.microsoft.com/office/drawing/2014/main" id="{DD660629-494D-B191-A70B-82D8A71EB498}"/>
+              </a:ext>
+            </a:extLst>
+          </p:cNvPr>
+          <p:cNvPicPr>
+            <a:picLocks noChangeAspect="1"/>
+          </p:cNvPicPr>
+          <p:nvPr/>
+        </p:nvPicPr>
+        <p:blipFill>
+          <a:blip r:embed="rId3"/>
+          <a:stretch>
+            <a:fillRect/>
+          </a:stretch>
+        </p:blipFill>
+        <p:spPr>
+          <a:xfrm>
+            <a:off x="1076793" y="2892104"/>
+            <a:ext cx="7633740" cy="3647102"/>
+          </a:xfrm>
+          <a:prstGeom prst="rect">
+            <a:avLst/>
+          </a:prstGeom>
+        </p:spPr>
+      </p:pic>
     </p:spTree>
+    <p:extLst>
+      <p:ext uri="{BB962C8B-B14F-4D97-AF65-F5344CB8AC3E}">
+        <p14:creationId xmlns:p14="http://schemas.microsoft.com/office/powerpoint/2010/main" val="1864082312"/>
+      </p:ext>
+    </p:extLst>
   </p:cSld>
   <p:clrMapOvr>
     <a:masterClrMapping/>
@@ -19994,6 +21383,434 @@
               <a:t>• Az összes megvásárlandó IP cím teljes költsége</a:t>
             </a:r>
             <a:endParaRPr sz="2700"/>
+          </a:p>
+        </p:txBody>
+      </p:sp>
+    </p:spTree>
+  </p:cSld>
+  <p:clrMapOvr>
+    <a:masterClrMapping/>
+  </p:clrMapOvr>
+</p:sld>
+</file>
+
+<file path=ppt/slides/slide50.xml><?xml version="1.0" encoding="utf-8"?>
+<p:sld xmlns:a="http://schemas.openxmlformats.org/drawingml/2006/main" xmlns:r="http://schemas.openxmlformats.org/officeDocument/2006/relationships" xmlns:p="http://schemas.openxmlformats.org/presentationml/2006/main">
+  <p:cSld>
+    <p:spTree>
+      <p:nvGrpSpPr>
+        <p:cNvPr id="1" name=""/>
+        <p:cNvGrpSpPr/>
+        <p:nvPr/>
+      </p:nvGrpSpPr>
+      <p:grpSpPr>
+        <a:xfrm>
+          <a:off x="0" y="0"/>
+          <a:ext cx="0" cy="0"/>
+          <a:chOff x="0" y="0"/>
+          <a:chExt cx="0" cy="0"/>
+        </a:xfrm>
+      </p:grpSpPr>
+      <p:sp>
+        <p:nvSpPr>
+          <p:cNvPr id="2" name="Cím 1">
+            <a:extLst>
+              <a:ext uri="{FF2B5EF4-FFF2-40B4-BE49-F238E27FC236}">
+                <a16:creationId xmlns:a16="http://schemas.microsoft.com/office/drawing/2014/main" id="{C0422B6E-0816-A39F-F528-B63773A8ABCE}"/>
+              </a:ext>
+            </a:extLst>
+          </p:cNvPr>
+          <p:cNvSpPr>
+            <a:spLocks noGrp="1"/>
+          </p:cNvSpPr>
+          <p:nvPr>
+            <p:ph type="title"/>
+          </p:nvPr>
+        </p:nvSpPr>
+        <p:spPr/>
+        <p:txBody>
+          <a:bodyPr/>
+          <a:lstStyle/>
+          <a:p>
+            <a:r>
+              <a:rPr lang="hu-HU" dirty="0"/>
+              <a:t>A gdprojekt.net szeged gépről</a:t>
+            </a:r>
+          </a:p>
+        </p:txBody>
+      </p:sp>
+      <p:pic>
+        <p:nvPicPr>
+          <p:cNvPr id="4" name="Kép 4">
+            <a:extLst>
+              <a:ext uri="{FF2B5EF4-FFF2-40B4-BE49-F238E27FC236}">
+                <a16:creationId xmlns:a16="http://schemas.microsoft.com/office/drawing/2014/main" id="{770BF6B7-4E5F-02AC-76CF-FEE427F758C4}"/>
+              </a:ext>
+            </a:extLst>
+          </p:cNvPr>
+          <p:cNvPicPr>
+            <a:picLocks noChangeAspect="1"/>
+          </p:cNvPicPr>
+          <p:nvPr/>
+        </p:nvPicPr>
+        <p:blipFill>
+          <a:blip r:embed="rId2"/>
+          <a:stretch>
+            <a:fillRect/>
+          </a:stretch>
+        </p:blipFill>
+        <p:spPr>
+          <a:xfrm>
+            <a:off x="3050499" y="1770255"/>
+            <a:ext cx="4492052" cy="4379294"/>
+          </a:xfrm>
+          <a:prstGeom prst="rect">
+            <a:avLst/>
+          </a:prstGeom>
+        </p:spPr>
+      </p:pic>
+    </p:spTree>
+    <p:extLst>
+      <p:ext uri="{BB962C8B-B14F-4D97-AF65-F5344CB8AC3E}">
+        <p14:creationId xmlns:p14="http://schemas.microsoft.com/office/powerpoint/2010/main" val="4147892908"/>
+      </p:ext>
+    </p:extLst>
+  </p:cSld>
+  <p:clrMapOvr>
+    <a:masterClrMapping/>
+  </p:clrMapOvr>
+</p:sld>
+</file>
+
+<file path=ppt/slides/slide51.xml><?xml version="1.0" encoding="utf-8"?>
+<p:sld xmlns:a="http://schemas.openxmlformats.org/drawingml/2006/main" xmlns:r="http://schemas.openxmlformats.org/officeDocument/2006/relationships" xmlns:p="http://schemas.openxmlformats.org/presentationml/2006/main">
+  <p:cSld>
+    <p:spTree>
+      <p:nvGrpSpPr>
+        <p:cNvPr id="1" name=""/>
+        <p:cNvGrpSpPr/>
+        <p:nvPr/>
+      </p:nvGrpSpPr>
+      <p:grpSpPr>
+        <a:xfrm>
+          <a:off x="0" y="0"/>
+          <a:ext cx="0" cy="0"/>
+          <a:chOff x="0" y="0"/>
+          <a:chExt cx="0" cy="0"/>
+        </a:xfrm>
+      </p:grpSpPr>
+      <p:sp>
+        <p:nvSpPr>
+          <p:cNvPr id="2" name="Cím 1">
+            <a:extLst>
+              <a:ext uri="{FF2B5EF4-FFF2-40B4-BE49-F238E27FC236}">
+                <a16:creationId xmlns:a16="http://schemas.microsoft.com/office/drawing/2014/main" id="{6FC81519-6E2D-C435-34FE-1EC1192EBC3A}"/>
+              </a:ext>
+            </a:extLst>
+          </p:cNvPr>
+          <p:cNvSpPr>
+            <a:spLocks noGrp="1"/>
+          </p:cNvSpPr>
+          <p:nvPr>
+            <p:ph type="title"/>
+          </p:nvPr>
+        </p:nvSpPr>
+        <p:spPr/>
+        <p:txBody>
+          <a:bodyPr/>
+          <a:lstStyle/>
+          <a:p>
+            <a:r>
+              <a:rPr lang="hu-HU" dirty="0"/>
+              <a:t>SSH és telnet</a:t>
+            </a:r>
+          </a:p>
+        </p:txBody>
+      </p:sp>
+      <p:sp>
+        <p:nvSpPr>
+          <p:cNvPr id="3" name="Szöveg helye 2">
+            <a:extLst>
+              <a:ext uri="{FF2B5EF4-FFF2-40B4-BE49-F238E27FC236}">
+                <a16:creationId xmlns:a16="http://schemas.microsoft.com/office/drawing/2014/main" id="{81964864-88AA-0222-0E00-9541C9DC0C96}"/>
+              </a:ext>
+            </a:extLst>
+          </p:cNvPr>
+          <p:cNvSpPr>
+            <a:spLocks noGrp="1"/>
+          </p:cNvSpPr>
+          <p:nvPr>
+            <p:ph type="body" idx="1"/>
+          </p:nvPr>
+        </p:nvSpPr>
+        <p:spPr>
+          <a:xfrm>
+            <a:off x="838200" y="1457117"/>
+            <a:ext cx="10515600" cy="4351338"/>
+          </a:xfrm>
+        </p:spPr>
+        <p:txBody>
+          <a:bodyPr/>
+          <a:lstStyle/>
+          <a:p>
+            <a:r>
+              <a:rPr lang="hu-HU" dirty="0"/>
+              <a:t>Az </a:t>
+            </a:r>
+            <a:r>
+              <a:rPr lang="hu-HU" dirty="0" err="1"/>
+              <a:t>ssh</a:t>
+            </a:r>
+            <a:r>
+              <a:rPr lang="hu-HU" dirty="0"/>
+              <a:t>-hoz felhasználóra is szükség van, de a </a:t>
+            </a:r>
+            <a:r>
+              <a:rPr lang="hu-HU" dirty="0" err="1"/>
+              <a:t>telnet.nél</a:t>
+            </a:r>
+            <a:r>
+              <a:rPr lang="hu-HU" dirty="0"/>
+              <a:t> csak </a:t>
+            </a:r>
+            <a:r>
+              <a:rPr lang="hu-HU" dirty="0" err="1"/>
+              <a:t>ip</a:t>
+            </a:r>
+            <a:r>
+              <a:rPr lang="hu-HU" dirty="0"/>
+              <a:t> cím kell</a:t>
+            </a:r>
+          </a:p>
+        </p:txBody>
+      </p:sp>
+      <p:pic>
+        <p:nvPicPr>
+          <p:cNvPr id="5" name="Kép 5" descr="A képen szöveg látható&#10;&#10;Automatikusan generált leírás">
+            <a:extLst>
+              <a:ext uri="{FF2B5EF4-FFF2-40B4-BE49-F238E27FC236}">
+                <a16:creationId xmlns:a16="http://schemas.microsoft.com/office/drawing/2014/main" id="{C23659C6-3CF8-E4E5-E58E-9E3EA775BFDE}"/>
+              </a:ext>
+            </a:extLst>
+          </p:cNvPr>
+          <p:cNvPicPr>
+            <a:picLocks noChangeAspect="1"/>
+          </p:cNvPicPr>
+          <p:nvPr/>
+        </p:nvPicPr>
+        <p:blipFill>
+          <a:blip r:embed="rId2"/>
+          <a:stretch>
+            <a:fillRect/>
+          </a:stretch>
+        </p:blipFill>
+        <p:spPr>
+          <a:xfrm>
+            <a:off x="108679" y="2241351"/>
+            <a:ext cx="5872396" cy="2300344"/>
+          </a:xfrm>
+          <a:prstGeom prst="rect">
+            <a:avLst/>
+          </a:prstGeom>
+        </p:spPr>
+      </p:pic>
+      <p:pic>
+        <p:nvPicPr>
+          <p:cNvPr id="6" name="Kép 6">
+            <a:extLst>
+              <a:ext uri="{FF2B5EF4-FFF2-40B4-BE49-F238E27FC236}">
+                <a16:creationId xmlns:a16="http://schemas.microsoft.com/office/drawing/2014/main" id="{546BB044-0BA0-BB1E-31E8-707E304505CE}"/>
+              </a:ext>
+            </a:extLst>
+          </p:cNvPr>
+          <p:cNvPicPr>
+            <a:picLocks noChangeAspect="1"/>
+          </p:cNvPicPr>
+          <p:nvPr/>
+        </p:nvPicPr>
+        <p:blipFill>
+          <a:blip r:embed="rId3"/>
+          <a:stretch>
+            <a:fillRect/>
+          </a:stretch>
+        </p:blipFill>
+        <p:spPr>
+          <a:xfrm>
+            <a:off x="6098499" y="2201505"/>
+            <a:ext cx="5884888" cy="2373795"/>
+          </a:xfrm>
+          <a:prstGeom prst="rect">
+            <a:avLst/>
+          </a:prstGeom>
+        </p:spPr>
+      </p:pic>
+      <p:pic>
+        <p:nvPicPr>
+          <p:cNvPr id="7" name="Kép 7" descr="A képen szöveg látható&#10;&#10;Automatikusan generált leírás">
+            <a:extLst>
+              <a:ext uri="{FF2B5EF4-FFF2-40B4-BE49-F238E27FC236}">
+                <a16:creationId xmlns:a16="http://schemas.microsoft.com/office/drawing/2014/main" id="{837ED2B4-EB09-EBC4-2C71-8CC3819CD4D9}"/>
+              </a:ext>
+            </a:extLst>
+          </p:cNvPr>
+          <p:cNvPicPr>
+            <a:picLocks noChangeAspect="1"/>
+          </p:cNvPicPr>
+          <p:nvPr/>
+        </p:nvPicPr>
+        <p:blipFill>
+          <a:blip r:embed="rId4"/>
+          <a:stretch>
+            <a:fillRect/>
+          </a:stretch>
+        </p:blipFill>
+        <p:spPr>
+          <a:xfrm>
+            <a:off x="108679" y="4644973"/>
+            <a:ext cx="5853659" cy="2083841"/>
+          </a:xfrm>
+          <a:prstGeom prst="rect">
+            <a:avLst/>
+          </a:prstGeom>
+        </p:spPr>
+      </p:pic>
+      <p:pic>
+        <p:nvPicPr>
+          <p:cNvPr id="8" name="Kép 8">
+            <a:extLst>
+              <a:ext uri="{FF2B5EF4-FFF2-40B4-BE49-F238E27FC236}">
+                <a16:creationId xmlns:a16="http://schemas.microsoft.com/office/drawing/2014/main" id="{94009C5E-7367-4576-76FE-2BB853A11656}"/>
+              </a:ext>
+            </a:extLst>
+          </p:cNvPr>
+          <p:cNvPicPr>
+            <a:picLocks noChangeAspect="1"/>
+          </p:cNvPicPr>
+          <p:nvPr/>
+        </p:nvPicPr>
+        <p:blipFill>
+          <a:blip r:embed="rId5"/>
+          <a:stretch>
+            <a:fillRect/>
+          </a:stretch>
+        </p:blipFill>
+        <p:spPr>
+          <a:xfrm>
+            <a:off x="6098498" y="4672319"/>
+            <a:ext cx="5628806" cy="2079114"/>
+          </a:xfrm>
+          <a:prstGeom prst="rect">
+            <a:avLst/>
+          </a:prstGeom>
+        </p:spPr>
+      </p:pic>
+    </p:spTree>
+    <p:extLst>
+      <p:ext uri="{BB962C8B-B14F-4D97-AF65-F5344CB8AC3E}">
+        <p14:creationId xmlns:p14="http://schemas.microsoft.com/office/powerpoint/2010/main" val="3478510319"/>
+      </p:ext>
+    </p:extLst>
+  </p:cSld>
+  <p:clrMapOvr>
+    <a:masterClrMapping/>
+  </p:clrMapOvr>
+</p:sld>
+</file>
+
+<file path=ppt/slides/slide52.xml><?xml version="1.0" encoding="utf-8"?>
+<p:sld xmlns:a="http://schemas.openxmlformats.org/drawingml/2006/main" xmlns:r="http://schemas.openxmlformats.org/officeDocument/2006/relationships" xmlns:p="http://schemas.openxmlformats.org/presentationml/2006/main">
+  <p:cSld>
+    <p:spTree>
+      <p:nvGrpSpPr>
+        <p:cNvPr id="1" name="Shape 258"/>
+        <p:cNvGrpSpPr/>
+        <p:nvPr/>
+      </p:nvGrpSpPr>
+      <p:grpSpPr>
+        <a:xfrm>
+          <a:off x="0" y="0"/>
+          <a:ext cx="0" cy="0"/>
+          <a:chOff x="0" y="0"/>
+          <a:chExt cx="0" cy="0"/>
+        </a:xfrm>
+      </p:grpSpPr>
+      <p:sp>
+        <p:nvSpPr>
+          <p:cNvPr id="259" name="Google Shape;259;g18fd315c07e_0_483"/>
+          <p:cNvSpPr txBox="1">
+            <a:spLocks noGrp="1"/>
+          </p:cNvSpPr>
+          <p:nvPr>
+            <p:ph type="ctrTitle"/>
+          </p:nvPr>
+        </p:nvSpPr>
+        <p:spPr>
+          <a:xfrm>
+            <a:off x="1524000" y="1122363"/>
+            <a:ext cx="9144000" cy="2387700"/>
+          </a:xfrm>
+          <a:prstGeom prst="rect">
+            <a:avLst/>
+          </a:prstGeom>
+        </p:spPr>
+        <p:txBody>
+          <a:bodyPr spcFirstLastPara="1" wrap="square" lIns="91425" tIns="45700" rIns="91425" bIns="45700" anchor="b" anchorCtr="0">
+            <a:normAutofit/>
+          </a:bodyPr>
+          <a:lstStyle/>
+          <a:p>
+            <a:pPr marL="0" lvl="0" indent="0" algn="ctr" rtl="0">
+              <a:spcBef>
+                <a:spcPts val="0"/>
+              </a:spcBef>
+              <a:spcAft>
+                <a:spcPts val="0"/>
+              </a:spcAft>
+              <a:buNone/>
+            </a:pPr>
+            <a:r>
+              <a:rPr lang="hu-HU"/>
+              <a:t>Köszönjük a figyelmet!</a:t>
+            </a:r>
+            <a:endParaRPr/>
+          </a:p>
+        </p:txBody>
+      </p:sp>
+      <p:sp>
+        <p:nvSpPr>
+          <p:cNvPr id="260" name="Google Shape;260;g18fd315c07e_0_483"/>
+          <p:cNvSpPr txBox="1">
+            <a:spLocks noGrp="1"/>
+          </p:cNvSpPr>
+          <p:nvPr>
+            <p:ph type="subTitle" idx="1"/>
+          </p:nvPr>
+        </p:nvSpPr>
+        <p:spPr>
+          <a:xfrm>
+            <a:off x="1524000" y="3602038"/>
+            <a:ext cx="9144000" cy="1655700"/>
+          </a:xfrm>
+          <a:prstGeom prst="rect">
+            <a:avLst/>
+          </a:prstGeom>
+        </p:spPr>
+        <p:txBody>
+          <a:bodyPr spcFirstLastPara="1" wrap="square" lIns="91425" tIns="45700" rIns="91425" bIns="45700" anchor="t" anchorCtr="0">
+            <a:normAutofit/>
+          </a:bodyPr>
+          <a:lstStyle/>
+          <a:p>
+            <a:pPr marL="0" lvl="0" indent="0" algn="ctr" rtl="0">
+              <a:spcBef>
+                <a:spcPts val="1000"/>
+              </a:spcBef>
+              <a:spcAft>
+                <a:spcPts val="0"/>
+              </a:spcAft>
+              <a:buNone/>
+            </a:pPr>
+            <a:endParaRPr/>
           </a:p>
         </p:txBody>
       </p:sp>

</xml_diff>

<commit_message>
a baromkodásaimat kitöröltem és javítottam a ppt-n amit eddig nem csináltam
</commit_message>
<xml_diff>
--- a/Prezentációk/School_projects_ppt.pptx
+++ b/Prezentációk/School_projects_ppt.pptx
@@ -306,7 +306,9 @@
 <file path=ppt/revisionInfo.xml><?xml version="1.0" encoding="utf-8"?>
 <p1510:revInfo xmlns:a="http://schemas.openxmlformats.org/drawingml/2006/main" xmlns:r="http://schemas.openxmlformats.org/officeDocument/2006/relationships" xmlns:p1510="http://schemas.microsoft.com/office/powerpoint/2015/10/main">
   <p1510:revLst>
+    <p1510:client id="{4B94A305-E4B5-EE3B-FD6C-ADBBD3EFC034}" v="3" dt="2022-12-05T00:30:19.575"/>
     <p1510:client id="{5BB938A3-DAED-2D6C-F574-E62D55234E16}" v="706" dt="2022-12-04T19:01:25.957"/>
+    <p1510:client id="{F5BC2DF5-922C-6107-9206-8EA42FDEC88B}" v="23" dt="2022-12-05T00:32:11.865"/>
   </p1510:revLst>
 </p1510:revInfo>
 </file>
@@ -16386,71 +16388,56 @@
       </p:sp>
       <p:pic>
         <p:nvPicPr>
-          <p:cNvPr id="208" name="Google Shape;208;g18fd315c07e_0_491"/>
-          <p:cNvPicPr preferRelativeResize="0"/>
+          <p:cNvPr id="2" name="Kép 2" descr="A képen szöveg látható&#10;&#10;Automatikusan generált leírás">
+            <a:extLst>
+              <a:ext uri="{FF2B5EF4-FFF2-40B4-BE49-F238E27FC236}">
+                <a16:creationId xmlns:a16="http://schemas.microsoft.com/office/drawing/2014/main" id="{DA02C96C-48AC-1DE1-7905-DEDF4A31DC2C}"/>
+              </a:ext>
+            </a:extLst>
+          </p:cNvPr>
+          <p:cNvPicPr>
+            <a:picLocks noChangeAspect="1"/>
+          </p:cNvPicPr>
           <p:nvPr/>
         </p:nvPicPr>
         <p:blipFill>
-          <a:blip r:embed="rId3">
-            <a:alphaModFix/>
-          </a:blip>
+          <a:blip r:embed="rId3"/>
           <a:stretch>
             <a:fillRect/>
           </a:stretch>
         </p:blipFill>
         <p:spPr>
           <a:xfrm>
-            <a:off x="4335475" y="1690825"/>
-            <a:ext cx="4019299" cy="4855124"/>
+            <a:off x="3937416" y="1606137"/>
+            <a:ext cx="4573249" cy="4407725"/>
           </a:xfrm>
           <a:prstGeom prst="rect">
             <a:avLst/>
           </a:prstGeom>
-          <a:noFill/>
-          <a:ln>
-            <a:noFill/>
-          </a:ln>
         </p:spPr>
       </p:pic>
       <p:sp>
         <p:nvSpPr>
-          <p:cNvPr id="209" name="Google Shape;209;g18fd315c07e_0_491"/>
-          <p:cNvSpPr txBox="1">
+          <p:cNvPr id="4" name="Cím 3">
+            <a:extLst>
+              <a:ext uri="{FF2B5EF4-FFF2-40B4-BE49-F238E27FC236}">
+                <a16:creationId xmlns:a16="http://schemas.microsoft.com/office/drawing/2014/main" id="{FD807869-F8C1-3865-1A0E-A9FB6CEB38C8}"/>
+              </a:ext>
+            </a:extLst>
+          </p:cNvPr>
+          <p:cNvSpPr>
             <a:spLocks noGrp="1"/>
           </p:cNvSpPr>
           <p:nvPr>
             <p:ph type="title"/>
           </p:nvPr>
         </p:nvSpPr>
-        <p:spPr>
-          <a:xfrm>
-            <a:off x="0" y="6658000"/>
-            <a:ext cx="2438700" cy="200100"/>
-          </a:xfrm>
-          <a:prstGeom prst="rect">
-            <a:avLst/>
-          </a:prstGeom>
-        </p:spPr>
+        <p:spPr/>
         <p:txBody>
-          <a:bodyPr spcFirstLastPara="1" wrap="square" lIns="91425" tIns="45700" rIns="91425" bIns="45700" anchor="ctr" anchorCtr="0">
-            <a:normAutofit/>
-          </a:bodyPr>
+          <a:bodyPr/>
           <a:lstStyle/>
           <a:p>
-            <a:pPr marL="0" lvl="0" indent="0" algn="l" rtl="0">
-              <a:spcBef>
-                <a:spcPts val="0"/>
-              </a:spcBef>
-              <a:spcAft>
-                <a:spcPts val="0"/>
-              </a:spcAft>
-              <a:buNone/>
-            </a:pPr>
-            <a:r>
-              <a:rPr lang="hu-HU" sz="700"/>
-              <a:t>HáT dE eZeK nEm Is PaRaNcSoK sZöVeGéRtÉs EgYeS ?!?!?</a:t>
-            </a:r>
-            <a:endParaRPr sz="700"/>
+            <a:endParaRPr lang="hu-HU"/>
           </a:p>
         </p:txBody>
       </p:sp>
@@ -16869,74 +16856,64 @@
       </p:sp>
       <p:pic>
         <p:nvPicPr>
-          <p:cNvPr id="215" name="Google Shape;215;g18fd315c07e_0_497"/>
-          <p:cNvPicPr preferRelativeResize="0"/>
+          <p:cNvPr id="4" name="Kép 4" descr="A képen szöveg látható&#10;&#10;Automatikusan generált leírás">
+            <a:extLst>
+              <a:ext uri="{FF2B5EF4-FFF2-40B4-BE49-F238E27FC236}">
+                <a16:creationId xmlns:a16="http://schemas.microsoft.com/office/drawing/2014/main" id="{A943AA9D-35CE-52AF-E66F-AFD06618CDB9}"/>
+              </a:ext>
+            </a:extLst>
+          </p:cNvPr>
+          <p:cNvPicPr>
+            <a:picLocks noChangeAspect="1"/>
+          </p:cNvPicPr>
           <p:nvPr/>
         </p:nvPicPr>
         <p:blipFill>
-          <a:blip r:embed="rId3">
-            <a:alphaModFix/>
-          </a:blip>
+          <a:blip r:embed="rId3"/>
           <a:stretch>
             <a:fillRect/>
           </a:stretch>
         </p:blipFill>
         <p:spPr>
           <a:xfrm>
-            <a:off x="4255600" y="1690825"/>
-            <a:ext cx="3946627" cy="4862375"/>
-          </a:xfrm>
-          <a:prstGeom prst="rect">
-            <a:avLst/>
-          </a:prstGeom>
-          <a:noFill/>
-          <a:ln>
-            <a:noFill/>
-          </a:ln>
-        </p:spPr>
-      </p:pic>
-      <p:sp>
-        <p:nvSpPr>
-          <p:cNvPr id="216" name="Google Shape;216;g18fd315c07e_0_497"/>
-          <p:cNvSpPr txBox="1">
-            <a:spLocks noGrp="1"/>
-          </p:cNvSpPr>
-          <p:nvPr>
-            <p:ph type="title"/>
-          </p:nvPr>
-        </p:nvSpPr>
-        <p:spPr>
-          <a:xfrm>
-            <a:off x="0" y="6677350"/>
-            <a:ext cx="2361300" cy="180600"/>
+            <a:off x="433465" y="1491425"/>
+            <a:ext cx="5991068" cy="4062526"/>
           </a:xfrm>
           <a:prstGeom prst="rect">
             <a:avLst/>
           </a:prstGeom>
         </p:spPr>
-        <p:txBody>
-          <a:bodyPr spcFirstLastPara="1" wrap="square" lIns="91425" tIns="45700" rIns="91425" bIns="45700" anchor="ctr" anchorCtr="0">
-            <a:normAutofit fontScale="90000"/>
-          </a:bodyPr>
-          <a:lstStyle/>
-          <a:p>
-            <a:pPr marL="0" lvl="0" indent="0" algn="l" rtl="0">
-              <a:spcBef>
-                <a:spcPts val="0"/>
-              </a:spcBef>
-              <a:spcAft>
-                <a:spcPts val="0"/>
-              </a:spcAft>
-              <a:buNone/>
-            </a:pPr>
-            <a:r>
-              <a:rPr lang="hu-HU" sz="700"/>
-              <a:t>HáT dE eZeK nEm Is PaRaNcSoK sZöVeGéRtÉs EgYeS ?!?!?</a:t>
-            </a:r>
-            <a:endParaRPr sz="700"/>
-          </a:p>
-        </p:txBody>
-      </p:sp>
+      </p:pic>
+      <p:pic>
+        <p:nvPicPr>
+          <p:cNvPr id="5" name="Kép 5" descr="A képen szöveg látható&#10;&#10;Automatikusan generált leírás">
+            <a:extLst>
+              <a:ext uri="{FF2B5EF4-FFF2-40B4-BE49-F238E27FC236}">
+                <a16:creationId xmlns:a16="http://schemas.microsoft.com/office/drawing/2014/main" id="{0B3B9245-A60A-852F-68DE-ED77C95A2263}"/>
+              </a:ext>
+            </a:extLst>
+          </p:cNvPr>
+          <p:cNvPicPr>
+            <a:picLocks noChangeAspect="1"/>
+          </p:cNvPicPr>
+          <p:nvPr/>
+        </p:nvPicPr>
+        <p:blipFill>
+          <a:blip r:embed="rId4"/>
+          <a:stretch>
+            <a:fillRect/>
+          </a:stretch>
+        </p:blipFill>
+        <p:spPr>
+          <a:xfrm>
+            <a:off x="5898629" y="1757584"/>
+            <a:ext cx="5485150" cy="3786291"/>
+          </a:xfrm>
+          <a:prstGeom prst="rect">
+            <a:avLst/>
+          </a:prstGeom>
+        </p:spPr>
+      </p:pic>
     </p:spTree>
   </p:cSld>
   <p:clrMapOvr>
@@ -20671,7 +20648,7 @@
           <a:p>
             <a:r>
               <a:rPr lang="hu-HU" dirty="0"/>
-              <a:t>Na vajon gyerekek mi volt a feladat?</a:t>
+              <a:t>Mi volt a feladat?</a:t>
             </a:r>
           </a:p>
         </p:txBody>

</xml_diff>